<commit_message>
Added material for negating existential quantification
</commit_message>
<xml_diff>
--- a/11_Existential_Quantification/Exists.pptx
+++ b/11_Existential_Quantification/Exists.pptx
@@ -5,7 +5,7 @@
     <p:sldMasterId id="2147483648" r:id="rId1"/>
   </p:sldMasterIdLst>
   <p:notesMasterIdLst>
-    <p:notesMasterId r:id="rId19"/>
+    <p:notesMasterId r:id="rId22"/>
   </p:notesMasterIdLst>
   <p:sldIdLst>
     <p:sldId id="258" r:id="rId2"/>
@@ -24,7 +24,10 @@
     <p:sldId id="368" r:id="rId15"/>
     <p:sldId id="369" r:id="rId16"/>
     <p:sldId id="370" r:id="rId17"/>
-    <p:sldId id="261" r:id="rId18"/>
+    <p:sldId id="371" r:id="rId18"/>
+    <p:sldId id="372" r:id="rId19"/>
+    <p:sldId id="373" r:id="rId20"/>
+    <p:sldId id="261" r:id="rId21"/>
   </p:sldIdLst>
   <p:sldSz cx="12192000" cy="6858000"/>
   <p:notesSz cx="6858000" cy="9144000"/>
@@ -5745,6 +5748,1058 @@
 <file path=ppt/slides/slide17.xml><?xml version="1.0" encoding="utf-8"?>
 <p:sld xmlns:a="http://schemas.openxmlformats.org/drawingml/2006/main" xmlns:r="http://schemas.openxmlformats.org/officeDocument/2006/relationships" xmlns:p="http://schemas.openxmlformats.org/presentationml/2006/main">
   <p:cSld>
+    <p:spTree>
+      <p:nvGrpSpPr>
+        <p:cNvPr id="1" name=""/>
+        <p:cNvGrpSpPr/>
+        <p:nvPr/>
+      </p:nvGrpSpPr>
+      <p:grpSpPr>
+        <a:xfrm>
+          <a:off x="0" y="0"/>
+          <a:ext cx="0" cy="0"/>
+          <a:chOff x="0" y="0"/>
+          <a:chExt cx="0" cy="0"/>
+        </a:xfrm>
+      </p:grpSpPr>
+      <p:sp>
+        <p:nvSpPr>
+          <p:cNvPr id="2" name="Title 1">
+            <a:extLst>
+              <a:ext uri="{FF2B5EF4-FFF2-40B4-BE49-F238E27FC236}">
+                <a16:creationId xmlns:a16="http://schemas.microsoft.com/office/drawing/2014/main" id="{2C092FAD-C4B2-3E4E-B257-739B2DEE018F}"/>
+              </a:ext>
+            </a:extLst>
+          </p:cNvPr>
+          <p:cNvSpPr>
+            <a:spLocks noGrp="1"/>
+          </p:cNvSpPr>
+          <p:nvPr>
+            <p:ph type="title"/>
+          </p:nvPr>
+        </p:nvSpPr>
+        <p:spPr/>
+        <p:txBody>
+          <a:bodyPr/>
+          <a:lstStyle/>
+          <a:p>
+            <a:r>
+              <a:rPr lang="en-US" dirty="0"/>
+              <a:t>Fooling All of the People Again</a:t>
+            </a:r>
+          </a:p>
+        </p:txBody>
+      </p:sp>
+      <p:sp>
+        <p:nvSpPr>
+          <p:cNvPr id="3" name="Content Placeholder 2">
+            <a:extLst>
+              <a:ext uri="{FF2B5EF4-FFF2-40B4-BE49-F238E27FC236}">
+                <a16:creationId xmlns:a16="http://schemas.microsoft.com/office/drawing/2014/main" id="{CDED7AB4-F91F-B54A-95B9-66C3C755F738}"/>
+              </a:ext>
+            </a:extLst>
+          </p:cNvPr>
+          <p:cNvSpPr>
+            <a:spLocks noGrp="1"/>
+          </p:cNvSpPr>
+          <p:nvPr>
+            <p:ph idx="1"/>
+          </p:nvPr>
+        </p:nvSpPr>
+        <p:spPr/>
+        <p:txBody>
+          <a:bodyPr>
+            <a:normAutofit fontScale="92500" lnSpcReduction="10000"/>
+          </a:bodyPr>
+          <a:lstStyle/>
+          <a:p>
+            <a:r>
+              <a:rPr lang="en-US" dirty="0"/>
+              <a:t>Remember this claim:</a:t>
+            </a:r>
+          </a:p>
+          <a:p>
+            <a:pPr lvl="1"/>
+            <a:r>
+              <a:rPr lang="en-US" dirty="0"/>
+              <a:t>∃ t ∈ time, ∀ p ∈ People, fool(p, t) → ∀ p ∈ People, ∃ t ∈ time, fool(p, t)</a:t>
+            </a:r>
+          </a:p>
+          <a:p>
+            <a:r>
+              <a:rPr lang="en-US" dirty="0"/>
+              <a:t>Let's look at a general proof</a:t>
+            </a:r>
+          </a:p>
+          <a:p>
+            <a:pPr marL="0" indent="0">
+              <a:buNone/>
+            </a:pPr>
+            <a:r>
+              <a:rPr lang="en-US" dirty="0">
+                <a:latin typeface="Courier New" panose="02070309020205020404" pitchFamily="49" charset="0"/>
+                <a:cs typeface="Courier New" panose="02070309020205020404" pitchFamily="49" charset="0"/>
+              </a:rPr>
+              <a:t>theorem </a:t>
+            </a:r>
+            <a:r>
+              <a:rPr lang="en-US" dirty="0" err="1">
+                <a:latin typeface="Courier New" panose="02070309020205020404" pitchFamily="49" charset="0"/>
+                <a:cs typeface="Courier New" panose="02070309020205020404" pitchFamily="49" charset="0"/>
+              </a:rPr>
+              <a:t>existsforall_impl_forallexists</a:t>
+            </a:r>
+            <a:r>
+              <a:rPr lang="en-US" dirty="0">
+                <a:latin typeface="Courier New" panose="02070309020205020404" pitchFamily="49" charset="0"/>
+                <a:cs typeface="Courier New" panose="02070309020205020404" pitchFamily="49" charset="0"/>
+              </a:rPr>
+              <a:t>:</a:t>
+            </a:r>
+          </a:p>
+          <a:p>
+            <a:pPr marL="0" indent="0">
+              <a:buNone/>
+            </a:pPr>
+            <a:r>
+              <a:rPr lang="en-US" dirty="0">
+                <a:latin typeface="Courier New" panose="02070309020205020404" pitchFamily="49" charset="0"/>
+                <a:cs typeface="Courier New" panose="02070309020205020404" pitchFamily="49" charset="0"/>
+              </a:rPr>
+              <a:t>  ∀ (S T: Type) (pred: (S → T → Prop)),</a:t>
+            </a:r>
+          </a:p>
+          <a:p>
+            <a:pPr marL="0" indent="0">
+              <a:buNone/>
+            </a:pPr>
+            <a:r>
+              <a:rPr lang="en-US" dirty="0">
+                <a:latin typeface="Courier New" panose="02070309020205020404" pitchFamily="49" charset="0"/>
+                <a:cs typeface="Courier New" panose="02070309020205020404" pitchFamily="49" charset="0"/>
+              </a:rPr>
+              <a:t>    (∃ (t: T), ∀ (p: S), pred(p)(t)) →</a:t>
+            </a:r>
+          </a:p>
+          <a:p>
+            <a:pPr marL="0" indent="0">
+              <a:buNone/>
+            </a:pPr>
+            <a:r>
+              <a:rPr lang="en-US" dirty="0">
+                <a:latin typeface="Courier New" panose="02070309020205020404" pitchFamily="49" charset="0"/>
+                <a:cs typeface="Courier New" panose="02070309020205020404" pitchFamily="49" charset="0"/>
+              </a:rPr>
+              <a:t>      (∀ (p: S), ∃ (t: T), pred(p)(t)) :=</a:t>
+            </a:r>
+          </a:p>
+          <a:p>
+            <a:pPr marL="0" indent="0">
+              <a:buNone/>
+            </a:pPr>
+            <a:r>
+              <a:rPr lang="en-US" dirty="0">
+                <a:latin typeface="Courier New" panose="02070309020205020404" pitchFamily="49" charset="0"/>
+                <a:cs typeface="Courier New" panose="02070309020205020404" pitchFamily="49" charset="0"/>
+              </a:rPr>
+              <a:t>begin</a:t>
+            </a:r>
+          </a:p>
+          <a:p>
+            <a:pPr marL="0" indent="0">
+              <a:buNone/>
+            </a:pPr>
+            <a:r>
+              <a:rPr lang="en-US" dirty="0">
+                <a:latin typeface="Courier New" panose="02070309020205020404" pitchFamily="49" charset="0"/>
+                <a:cs typeface="Courier New" panose="02070309020205020404" pitchFamily="49" charset="0"/>
+              </a:rPr>
+              <a:t>  …</a:t>
+            </a:r>
+          </a:p>
+          <a:p>
+            <a:pPr marL="0" indent="0">
+              <a:buNone/>
+            </a:pPr>
+            <a:r>
+              <a:rPr lang="en-US" dirty="0">
+                <a:latin typeface="Courier New" panose="02070309020205020404" pitchFamily="49" charset="0"/>
+                <a:cs typeface="Courier New" panose="02070309020205020404" pitchFamily="49" charset="0"/>
+              </a:rPr>
+              <a:t>end</a:t>
+            </a:r>
+          </a:p>
+        </p:txBody>
+      </p:sp>
+      <p:sp>
+        <p:nvSpPr>
+          <p:cNvPr id="4" name="Slide Number Placeholder 3">
+            <a:extLst>
+              <a:ext uri="{FF2B5EF4-FFF2-40B4-BE49-F238E27FC236}">
+                <a16:creationId xmlns:a16="http://schemas.microsoft.com/office/drawing/2014/main" id="{47552C1F-8551-5744-B7AA-ADB7CF242878}"/>
+              </a:ext>
+            </a:extLst>
+          </p:cNvPr>
+          <p:cNvSpPr>
+            <a:spLocks noGrp="1"/>
+          </p:cNvSpPr>
+          <p:nvPr>
+            <p:ph type="sldNum" sz="quarter" idx="12"/>
+          </p:nvPr>
+        </p:nvSpPr>
+        <p:spPr/>
+        <p:txBody>
+          <a:bodyPr/>
+          <a:lstStyle/>
+          <a:p>
+            <a:fld id="{3352CBF5-17B8-4387-88A6-ABF9F8C64D5A}" type="slidenum">
+              <a:rPr lang="en-US" smtClean="0"/>
+              <a:t>17</a:t>
+            </a:fld>
+            <a:endParaRPr lang="en-US"/>
+          </a:p>
+        </p:txBody>
+      </p:sp>
+    </p:spTree>
+    <p:extLst>
+      <p:ext uri="{BB962C8B-B14F-4D97-AF65-F5344CB8AC3E}">
+        <p14:creationId xmlns:p14="http://schemas.microsoft.com/office/powerpoint/2010/main" val="1234314750"/>
+      </p:ext>
+    </p:extLst>
+  </p:cSld>
+  <p:clrMapOvr>
+    <a:masterClrMapping/>
+  </p:clrMapOvr>
+</p:sld>
+</file>
+
+<file path=ppt/slides/slide18.xml><?xml version="1.0" encoding="utf-8"?>
+<p:sld xmlns:a="http://schemas.openxmlformats.org/drawingml/2006/main" xmlns:r="http://schemas.openxmlformats.org/officeDocument/2006/relationships" xmlns:p="http://schemas.openxmlformats.org/presentationml/2006/main">
+  <p:cSld>
+    <p:spTree>
+      <p:nvGrpSpPr>
+        <p:cNvPr id="1" name=""/>
+        <p:cNvGrpSpPr/>
+        <p:nvPr/>
+      </p:nvGrpSpPr>
+      <p:grpSpPr>
+        <a:xfrm>
+          <a:off x="0" y="0"/>
+          <a:ext cx="0" cy="0"/>
+          <a:chOff x="0" y="0"/>
+          <a:chExt cx="0" cy="0"/>
+        </a:xfrm>
+      </p:grpSpPr>
+      <p:sp>
+        <p:nvSpPr>
+          <p:cNvPr id="2" name="Title 1">
+            <a:extLst>
+              <a:ext uri="{FF2B5EF4-FFF2-40B4-BE49-F238E27FC236}">
+                <a16:creationId xmlns:a16="http://schemas.microsoft.com/office/drawing/2014/main" id="{735F69AE-9F24-2B42-958C-9B10272048D4}"/>
+              </a:ext>
+            </a:extLst>
+          </p:cNvPr>
+          <p:cNvSpPr>
+            <a:spLocks noGrp="1"/>
+          </p:cNvSpPr>
+          <p:nvPr>
+            <p:ph type="title"/>
+          </p:nvPr>
+        </p:nvSpPr>
+        <p:spPr/>
+        <p:txBody>
+          <a:bodyPr/>
+          <a:lstStyle/>
+          <a:p>
+            <a:r>
+              <a:rPr lang="en-US" dirty="0"/>
+              <a:t>Negating Existential and Universal Quantifiers</a:t>
+            </a:r>
+          </a:p>
+        </p:txBody>
+      </p:sp>
+      <p:sp>
+        <p:nvSpPr>
+          <p:cNvPr id="3" name="Content Placeholder 2">
+            <a:extLst>
+              <a:ext uri="{FF2B5EF4-FFF2-40B4-BE49-F238E27FC236}">
+                <a16:creationId xmlns:a16="http://schemas.microsoft.com/office/drawing/2014/main" id="{CAFB8210-F26A-3F4E-9BDC-D1F17719D6A6}"/>
+              </a:ext>
+            </a:extLst>
+          </p:cNvPr>
+          <p:cNvSpPr>
+            <a:spLocks noGrp="1"/>
+          </p:cNvSpPr>
+          <p:nvPr>
+            <p:ph idx="1"/>
+          </p:nvPr>
+        </p:nvSpPr>
+        <p:spPr/>
+        <p:txBody>
+          <a:bodyPr/>
+          <a:lstStyle/>
+          <a:p>
+            <a:r>
+              <a:rPr lang="en-US" dirty="0"/>
+              <a:t>What happens when you negate an existential quantifier?</a:t>
+            </a:r>
+          </a:p>
+          <a:p>
+            <a:r>
+              <a:rPr lang="en-US" dirty="0"/>
+              <a:t>What does this mean:</a:t>
+            </a:r>
+          </a:p>
+          <a:p>
+            <a:pPr lvl="1"/>
+            <a:r>
+              <a:rPr lang="en-US" dirty="0"/>
+              <a:t>¬(∃ t ∈ time, fool(me, t)) — there does not exist a time when you can fool me</a:t>
+            </a:r>
+          </a:p>
+          <a:p>
+            <a:pPr lvl="1"/>
+            <a:r>
+              <a:rPr lang="en-US" dirty="0"/>
+              <a:t>∀ t ∈ time, ¬fool(me, t) — at any time, you will not fool me</a:t>
+            </a:r>
+          </a:p>
+          <a:p>
+            <a:pPr lvl="1"/>
+            <a:r>
+              <a:rPr lang="en-US" dirty="0"/>
+              <a:t>Are these equivalent?</a:t>
+            </a:r>
+          </a:p>
+          <a:p>
+            <a:r>
+              <a:rPr lang="en-US" dirty="0"/>
+              <a:t>How about this:</a:t>
+            </a:r>
+          </a:p>
+          <a:p>
+            <a:pPr lvl="1"/>
+            <a:r>
+              <a:rPr lang="en-US" dirty="0"/>
+              <a:t>¬(∀ t ∈ time, fool(me, t)) — you cannot fool me all of the time</a:t>
+            </a:r>
+          </a:p>
+          <a:p>
+            <a:pPr lvl="1"/>
+            <a:r>
+              <a:rPr lang="en-US" dirty="0"/>
+              <a:t>∃ t ∈ time, ¬fool(me, t) — there exists a time when you cannot fool me</a:t>
+            </a:r>
+          </a:p>
+          <a:p>
+            <a:pPr lvl="1"/>
+            <a:r>
+              <a:rPr lang="en-US" dirty="0"/>
+              <a:t>Are these equivalent?</a:t>
+            </a:r>
+          </a:p>
+        </p:txBody>
+      </p:sp>
+      <p:sp>
+        <p:nvSpPr>
+          <p:cNvPr id="4" name="Slide Number Placeholder 3">
+            <a:extLst>
+              <a:ext uri="{FF2B5EF4-FFF2-40B4-BE49-F238E27FC236}">
+                <a16:creationId xmlns:a16="http://schemas.microsoft.com/office/drawing/2014/main" id="{62C029A4-5654-1346-BB37-295037BBAA13}"/>
+              </a:ext>
+            </a:extLst>
+          </p:cNvPr>
+          <p:cNvSpPr>
+            <a:spLocks noGrp="1"/>
+          </p:cNvSpPr>
+          <p:nvPr>
+            <p:ph type="sldNum" sz="quarter" idx="12"/>
+          </p:nvPr>
+        </p:nvSpPr>
+        <p:spPr/>
+        <p:txBody>
+          <a:bodyPr/>
+          <a:lstStyle/>
+          <a:p>
+            <a:fld id="{3352CBF5-17B8-4387-88A6-ABF9F8C64D5A}" type="slidenum">
+              <a:rPr lang="en-US" smtClean="0"/>
+              <a:t>18</a:t>
+            </a:fld>
+            <a:endParaRPr lang="en-US"/>
+          </a:p>
+        </p:txBody>
+      </p:sp>
+    </p:spTree>
+    <p:extLst>
+      <p:ext uri="{BB962C8B-B14F-4D97-AF65-F5344CB8AC3E}">
+        <p14:creationId xmlns:p14="http://schemas.microsoft.com/office/powerpoint/2010/main" val="2396523662"/>
+      </p:ext>
+    </p:extLst>
+  </p:cSld>
+  <p:clrMapOvr>
+    <a:masterClrMapping/>
+  </p:clrMapOvr>
+</p:sld>
+</file>
+
+<file path=ppt/slides/slide19.xml><?xml version="1.0" encoding="utf-8"?>
+<p:sld xmlns:a="http://schemas.openxmlformats.org/drawingml/2006/main" xmlns:r="http://schemas.openxmlformats.org/officeDocument/2006/relationships" xmlns:p="http://schemas.openxmlformats.org/presentationml/2006/main">
+  <p:cSld>
+    <p:spTree>
+      <p:nvGrpSpPr>
+        <p:cNvPr id="1" name=""/>
+        <p:cNvGrpSpPr/>
+        <p:nvPr/>
+      </p:nvGrpSpPr>
+      <p:grpSpPr>
+        <a:xfrm>
+          <a:off x="0" y="0"/>
+          <a:ext cx="0" cy="0"/>
+          <a:chOff x="0" y="0"/>
+          <a:chExt cx="0" cy="0"/>
+        </a:xfrm>
+      </p:grpSpPr>
+      <p:sp>
+        <p:nvSpPr>
+          <p:cNvPr id="2" name="Title 1">
+            <a:extLst>
+              <a:ext uri="{FF2B5EF4-FFF2-40B4-BE49-F238E27FC236}">
+                <a16:creationId xmlns:a16="http://schemas.microsoft.com/office/drawing/2014/main" id="{1449AF91-8E55-704C-A6EE-036BD71C214F}"/>
+              </a:ext>
+            </a:extLst>
+          </p:cNvPr>
+          <p:cNvSpPr>
+            <a:spLocks noGrp="1"/>
+          </p:cNvSpPr>
+          <p:nvPr>
+            <p:ph type="title"/>
+          </p:nvPr>
+        </p:nvSpPr>
+        <p:spPr/>
+        <p:txBody>
+          <a:bodyPr/>
+          <a:lstStyle/>
+          <a:p>
+            <a:r>
+              <a:rPr lang="en-US" dirty="0"/>
+              <a:t>Proof of Existential Negation</a:t>
+            </a:r>
+          </a:p>
+        </p:txBody>
+      </p:sp>
+      <p:sp>
+        <p:nvSpPr>
+          <p:cNvPr id="3" name="Content Placeholder 2">
+            <a:extLst>
+              <a:ext uri="{FF2B5EF4-FFF2-40B4-BE49-F238E27FC236}">
+                <a16:creationId xmlns:a16="http://schemas.microsoft.com/office/drawing/2014/main" id="{AAAB3E00-239F-DB43-8A13-8A1A446C99EB}"/>
+              </a:ext>
+            </a:extLst>
+          </p:cNvPr>
+          <p:cNvSpPr>
+            <a:spLocks noGrp="1"/>
+          </p:cNvSpPr>
+          <p:nvPr>
+            <p:ph idx="1"/>
+          </p:nvPr>
+        </p:nvSpPr>
+        <p:spPr/>
+        <p:txBody>
+          <a:bodyPr>
+            <a:normAutofit fontScale="77500" lnSpcReduction="20000"/>
+          </a:bodyPr>
+          <a:lstStyle/>
+          <a:p>
+            <a:pPr marL="0" indent="0">
+              <a:buNone/>
+            </a:pPr>
+            <a:r>
+              <a:rPr lang="en-US" dirty="0">
+                <a:latin typeface="Courier New" panose="02070309020205020404" pitchFamily="49" charset="0"/>
+                <a:cs typeface="Courier New" panose="02070309020205020404" pitchFamily="49" charset="0"/>
+              </a:rPr>
+              <a:t>theorem </a:t>
+            </a:r>
+            <a:r>
+              <a:rPr lang="en-US" dirty="0" err="1">
+                <a:latin typeface="Courier New" panose="02070309020205020404" pitchFamily="49" charset="0"/>
+                <a:cs typeface="Courier New" panose="02070309020205020404" pitchFamily="49" charset="0"/>
+              </a:rPr>
+              <a:t>not_exists_t_iff_always_not_t</a:t>
+            </a:r>
+            <a:r>
+              <a:rPr lang="en-US" dirty="0">
+                <a:latin typeface="Courier New" panose="02070309020205020404" pitchFamily="49" charset="0"/>
+                <a:cs typeface="Courier New" panose="02070309020205020404" pitchFamily="49" charset="0"/>
+              </a:rPr>
+              <a:t>:</a:t>
+            </a:r>
+          </a:p>
+          <a:p>
+            <a:pPr marL="0" indent="0">
+              <a:buNone/>
+            </a:pPr>
+            <a:r>
+              <a:rPr lang="en-US" dirty="0">
+                <a:latin typeface="Courier New" panose="02070309020205020404" pitchFamily="49" charset="0"/>
+                <a:cs typeface="Courier New" panose="02070309020205020404" pitchFamily="49" charset="0"/>
+              </a:rPr>
+              <a:t>  ∀ (T: Type) (pred: (T → Prop)),</a:t>
+            </a:r>
+          </a:p>
+          <a:p>
+            <a:pPr marL="0" indent="0">
+              <a:buNone/>
+            </a:pPr>
+            <a:r>
+              <a:rPr lang="en-US" dirty="0">
+                <a:latin typeface="Courier New" panose="02070309020205020404" pitchFamily="49" charset="0"/>
+                <a:cs typeface="Courier New" panose="02070309020205020404" pitchFamily="49" charset="0"/>
+              </a:rPr>
+              <a:t>    (¬(∃ t: T, pred(t))) →</a:t>
+            </a:r>
+          </a:p>
+          <a:p>
+            <a:pPr marL="0" indent="0">
+              <a:buNone/>
+            </a:pPr>
+            <a:r>
+              <a:rPr lang="en-US" dirty="0">
+                <a:latin typeface="Courier New" panose="02070309020205020404" pitchFamily="49" charset="0"/>
+                <a:cs typeface="Courier New" panose="02070309020205020404" pitchFamily="49" charset="0"/>
+              </a:rPr>
+              <a:t>      ∀ t: T, ¬pred(t) :=</a:t>
+            </a:r>
+          </a:p>
+          <a:p>
+            <a:pPr marL="0" indent="0">
+              <a:buNone/>
+            </a:pPr>
+            <a:r>
+              <a:rPr lang="en-US" dirty="0">
+                <a:latin typeface="Courier New" panose="02070309020205020404" pitchFamily="49" charset="0"/>
+                <a:cs typeface="Courier New" panose="02070309020205020404" pitchFamily="49" charset="0"/>
+              </a:rPr>
+              <a:t>begin</a:t>
+            </a:r>
+          </a:p>
+          <a:p>
+            <a:pPr marL="0" indent="0">
+              <a:buNone/>
+            </a:pPr>
+            <a:r>
+              <a:rPr lang="en-US" dirty="0">
+                <a:latin typeface="Courier New" panose="02070309020205020404" pitchFamily="49" charset="0"/>
+                <a:cs typeface="Courier New" panose="02070309020205020404" pitchFamily="49" charset="0"/>
+              </a:rPr>
+              <a:t>  assume T pred,</a:t>
+            </a:r>
+          </a:p>
+          <a:p>
+            <a:pPr marL="0" indent="0">
+              <a:buNone/>
+            </a:pPr>
+            <a:r>
+              <a:rPr lang="en-US" dirty="0">
+                <a:latin typeface="Courier New" panose="02070309020205020404" pitchFamily="49" charset="0"/>
+                <a:cs typeface="Courier New" panose="02070309020205020404" pitchFamily="49" charset="0"/>
+              </a:rPr>
+              <a:t>  assume </a:t>
+            </a:r>
+            <a:r>
+              <a:rPr lang="en-US" dirty="0" err="1">
+                <a:latin typeface="Courier New" panose="02070309020205020404" pitchFamily="49" charset="0"/>
+                <a:cs typeface="Courier New" panose="02070309020205020404" pitchFamily="49" charset="0"/>
+              </a:rPr>
+              <a:t>pf_not_exists_t</a:t>
+            </a:r>
+            <a:r>
+              <a:rPr lang="en-US" dirty="0">
+                <a:latin typeface="Courier New" panose="02070309020205020404" pitchFamily="49" charset="0"/>
+                <a:cs typeface="Courier New" panose="02070309020205020404" pitchFamily="49" charset="0"/>
+              </a:rPr>
+              <a:t>,</a:t>
+            </a:r>
+          </a:p>
+          <a:p>
+            <a:pPr marL="0" indent="0">
+              <a:buNone/>
+            </a:pPr>
+            <a:r>
+              <a:rPr lang="en-US" dirty="0">
+                <a:latin typeface="Courier New" panose="02070309020205020404" pitchFamily="49" charset="0"/>
+                <a:cs typeface="Courier New" panose="02070309020205020404" pitchFamily="49" charset="0"/>
+              </a:rPr>
+              <a:t>  assume t,</a:t>
+            </a:r>
+          </a:p>
+          <a:p>
+            <a:pPr marL="0" indent="0">
+              <a:buNone/>
+            </a:pPr>
+            <a:r>
+              <a:rPr lang="en-US" dirty="0">
+                <a:latin typeface="Courier New" panose="02070309020205020404" pitchFamily="49" charset="0"/>
+                <a:cs typeface="Courier New" panose="02070309020205020404" pitchFamily="49" charset="0"/>
+              </a:rPr>
+              <a:t>  assume Q,</a:t>
+            </a:r>
+          </a:p>
+          <a:p>
+            <a:pPr marL="0" indent="0">
+              <a:buNone/>
+            </a:pPr>
+            <a:r>
+              <a:rPr lang="en-US" dirty="0">
+                <a:latin typeface="Courier New" panose="02070309020205020404" pitchFamily="49" charset="0"/>
+                <a:cs typeface="Courier New" panose="02070309020205020404" pitchFamily="49" charset="0"/>
+              </a:rPr>
+              <a:t>  have </a:t>
+            </a:r>
+            <a:r>
+              <a:rPr lang="en-US" dirty="0" err="1">
+                <a:latin typeface="Courier New" panose="02070309020205020404" pitchFamily="49" charset="0"/>
+                <a:cs typeface="Courier New" panose="02070309020205020404" pitchFamily="49" charset="0"/>
+              </a:rPr>
+              <a:t>pf_exists_t</a:t>
+            </a:r>
+            <a:r>
+              <a:rPr lang="en-US" dirty="0">
+                <a:latin typeface="Courier New" panose="02070309020205020404" pitchFamily="49" charset="0"/>
+                <a:cs typeface="Courier New" panose="02070309020205020404" pitchFamily="49" charset="0"/>
+              </a:rPr>
+              <a:t> := </a:t>
+            </a:r>
+            <a:r>
+              <a:rPr lang="en-US" dirty="0" err="1">
+                <a:latin typeface="Courier New" panose="02070309020205020404" pitchFamily="49" charset="0"/>
+                <a:cs typeface="Courier New" panose="02070309020205020404" pitchFamily="49" charset="0"/>
+              </a:rPr>
+              <a:t>exists.intro</a:t>
+            </a:r>
+            <a:r>
+              <a:rPr lang="en-US" dirty="0">
+                <a:latin typeface="Courier New" panose="02070309020205020404" pitchFamily="49" charset="0"/>
+                <a:cs typeface="Courier New" panose="02070309020205020404" pitchFamily="49" charset="0"/>
+              </a:rPr>
+              <a:t> t Q,</a:t>
+            </a:r>
+          </a:p>
+          <a:p>
+            <a:pPr marL="0" indent="0">
+              <a:buNone/>
+            </a:pPr>
+            <a:r>
+              <a:rPr lang="en-US">
+                <a:latin typeface="Courier New" panose="02070309020205020404" pitchFamily="49" charset="0"/>
+                <a:cs typeface="Courier New" panose="02070309020205020404" pitchFamily="49" charset="0"/>
+              </a:rPr>
+              <a:t>  exact </a:t>
+            </a:r>
+            <a:r>
+              <a:rPr lang="en-US" dirty="0">
+                <a:latin typeface="Courier New" panose="02070309020205020404" pitchFamily="49" charset="0"/>
+                <a:cs typeface="Courier New" panose="02070309020205020404" pitchFamily="49" charset="0"/>
+              </a:rPr>
+              <a:t>(</a:t>
+            </a:r>
+            <a:r>
+              <a:rPr lang="en-US" dirty="0" err="1">
+                <a:latin typeface="Courier New" panose="02070309020205020404" pitchFamily="49" charset="0"/>
+                <a:cs typeface="Courier New" panose="02070309020205020404" pitchFamily="49" charset="0"/>
+              </a:rPr>
+              <a:t>pf_not_exists_t</a:t>
+            </a:r>
+            <a:r>
+              <a:rPr lang="en-US" dirty="0">
+                <a:latin typeface="Courier New" panose="02070309020205020404" pitchFamily="49" charset="0"/>
+                <a:cs typeface="Courier New" panose="02070309020205020404" pitchFamily="49" charset="0"/>
+              </a:rPr>
+              <a:t> </a:t>
+            </a:r>
+            <a:r>
+              <a:rPr lang="en-US" dirty="0" err="1">
+                <a:latin typeface="Courier New" panose="02070309020205020404" pitchFamily="49" charset="0"/>
+                <a:cs typeface="Courier New" panose="02070309020205020404" pitchFamily="49" charset="0"/>
+              </a:rPr>
+              <a:t>pf_exists_t</a:t>
+            </a:r>
+            <a:r>
+              <a:rPr lang="en-US" dirty="0">
+                <a:latin typeface="Courier New" panose="02070309020205020404" pitchFamily="49" charset="0"/>
+                <a:cs typeface="Courier New" panose="02070309020205020404" pitchFamily="49" charset="0"/>
+              </a:rPr>
+              <a:t>)</a:t>
+            </a:r>
+          </a:p>
+          <a:p>
+            <a:pPr marL="0" indent="0">
+              <a:buNone/>
+            </a:pPr>
+            <a:r>
+              <a:rPr lang="en-US" dirty="0">
+                <a:latin typeface="Courier New" panose="02070309020205020404" pitchFamily="49" charset="0"/>
+                <a:cs typeface="Courier New" panose="02070309020205020404" pitchFamily="49" charset="0"/>
+              </a:rPr>
+              <a:t>end</a:t>
+            </a:r>
+          </a:p>
+        </p:txBody>
+      </p:sp>
+      <p:sp>
+        <p:nvSpPr>
+          <p:cNvPr id="4" name="Slide Number Placeholder 3">
+            <a:extLst>
+              <a:ext uri="{FF2B5EF4-FFF2-40B4-BE49-F238E27FC236}">
+                <a16:creationId xmlns:a16="http://schemas.microsoft.com/office/drawing/2014/main" id="{D9DB16FB-B5F5-6F41-8C3D-F14B1DADAB9C}"/>
+              </a:ext>
+            </a:extLst>
+          </p:cNvPr>
+          <p:cNvSpPr>
+            <a:spLocks noGrp="1"/>
+          </p:cNvSpPr>
+          <p:nvPr>
+            <p:ph type="sldNum" sz="quarter" idx="12"/>
+          </p:nvPr>
+        </p:nvSpPr>
+        <p:spPr/>
+        <p:txBody>
+          <a:bodyPr/>
+          <a:lstStyle/>
+          <a:p>
+            <a:fld id="{3352CBF5-17B8-4387-88A6-ABF9F8C64D5A}" type="slidenum">
+              <a:rPr lang="en-US" smtClean="0"/>
+              <a:t>19</a:t>
+            </a:fld>
+            <a:endParaRPr lang="en-US"/>
+          </a:p>
+        </p:txBody>
+      </p:sp>
+    </p:spTree>
+    <p:extLst>
+      <p:ext uri="{BB962C8B-B14F-4D97-AF65-F5344CB8AC3E}">
+        <p14:creationId xmlns:p14="http://schemas.microsoft.com/office/powerpoint/2010/main" val="791863670"/>
+      </p:ext>
+    </p:extLst>
+  </p:cSld>
+  <p:clrMapOvr>
+    <a:masterClrMapping/>
+  </p:clrMapOvr>
+</p:sld>
+</file>
+
+<file path=ppt/slides/slide2.xml><?xml version="1.0" encoding="utf-8"?>
+<p:sld xmlns:a="http://schemas.openxmlformats.org/drawingml/2006/main" xmlns:r="http://schemas.openxmlformats.org/officeDocument/2006/relationships" xmlns:p="http://schemas.openxmlformats.org/presentationml/2006/main">
+  <p:cSld>
+    <p:spTree>
+      <p:nvGrpSpPr>
+        <p:cNvPr id="1" name=""/>
+        <p:cNvGrpSpPr/>
+        <p:nvPr/>
+      </p:nvGrpSpPr>
+      <p:grpSpPr>
+        <a:xfrm>
+          <a:off x="0" y="0"/>
+          <a:ext cx="0" cy="0"/>
+          <a:chOff x="0" y="0"/>
+          <a:chExt cx="0" cy="0"/>
+        </a:xfrm>
+      </p:grpSpPr>
+      <p:sp>
+        <p:nvSpPr>
+          <p:cNvPr id="2" name="Title 1">
+            <a:extLst>
+              <a:ext uri="{FF2B5EF4-FFF2-40B4-BE49-F238E27FC236}">
+                <a16:creationId xmlns:a16="http://schemas.microsoft.com/office/drawing/2014/main" id="{2B419016-63A1-804E-A64E-506D76FDB939}"/>
+              </a:ext>
+            </a:extLst>
+          </p:cNvPr>
+          <p:cNvSpPr>
+            <a:spLocks noGrp="1"/>
+          </p:cNvSpPr>
+          <p:nvPr>
+            <p:ph type="title"/>
+          </p:nvPr>
+        </p:nvSpPr>
+        <p:spPr/>
+        <p:txBody>
+          <a:bodyPr/>
+          <a:lstStyle/>
+          <a:p>
+            <a:r>
+              <a:rPr lang="en-US" dirty="0"/>
+              <a:t>What is Existential Quantification?</a:t>
+            </a:r>
+          </a:p>
+        </p:txBody>
+      </p:sp>
+      <p:sp>
+        <p:nvSpPr>
+          <p:cNvPr id="3" name="Content Placeholder 2">
+            <a:extLst>
+              <a:ext uri="{FF2B5EF4-FFF2-40B4-BE49-F238E27FC236}">
+                <a16:creationId xmlns:a16="http://schemas.microsoft.com/office/drawing/2014/main" id="{9949A817-3AC3-E444-8ACB-8FC21F690AAB}"/>
+              </a:ext>
+            </a:extLst>
+          </p:cNvPr>
+          <p:cNvSpPr>
+            <a:spLocks noGrp="1"/>
+          </p:cNvSpPr>
+          <p:nvPr>
+            <p:ph idx="1"/>
+          </p:nvPr>
+        </p:nvSpPr>
+        <p:spPr>
+          <a:xfrm>
+            <a:off x="838200" y="1825624"/>
+            <a:ext cx="10515600" cy="4530725"/>
+          </a:xfrm>
+        </p:spPr>
+        <p:txBody>
+          <a:bodyPr>
+            <a:normAutofit fontScale="85000" lnSpcReduction="20000"/>
+          </a:bodyPr>
+          <a:lstStyle/>
+          <a:p>
+            <a:r>
+              <a:rPr lang="en-US" dirty="0"/>
+              <a:t>An existentially quantified proposition asserts that there is some value of some type for which some proposition involving that value is true. Here are a couple of examples:</a:t>
+            </a:r>
+          </a:p>
+          <a:p>
+            <a:pPr lvl="1"/>
+            <a:r>
+              <a:rPr lang="en-US" dirty="0"/>
+              <a:t>∃ m ∈ </a:t>
+            </a:r>
+            <a:r>
+              <a:rPr lang="en-US" dirty="0" err="1"/>
+              <a:t>ℕ</a:t>
+            </a:r>
+            <a:r>
+              <a:rPr lang="en-US" dirty="0"/>
+              <a:t>, m + m = 8</a:t>
+            </a:r>
+          </a:p>
+          <a:p>
+            <a:pPr lvl="1"/>
+            <a:r>
+              <a:rPr lang="en-US" dirty="0"/>
+              <a:t>∃ m ∈ </a:t>
+            </a:r>
+            <a:r>
+              <a:rPr lang="en-US" dirty="0" err="1"/>
+              <a:t>ℕ</a:t>
+            </a:r>
+            <a:r>
+              <a:rPr lang="en-US" dirty="0"/>
+              <a:t>, m &gt; 10</a:t>
+            </a:r>
+          </a:p>
+          <a:p>
+            <a:pPr lvl="1"/>
+            <a:r>
+              <a:rPr lang="en-US" dirty="0"/>
+              <a:t>∃ m ∈ </a:t>
+            </a:r>
+            <a:r>
+              <a:rPr lang="en-US" dirty="0" err="1"/>
+              <a:t>ℕ</a:t>
+            </a:r>
+            <a:r>
+              <a:rPr lang="en-US" dirty="0"/>
+              <a:t>, m - m = 3</a:t>
+            </a:r>
+          </a:p>
+          <a:p>
+            <a:r>
+              <a:rPr lang="en-US" dirty="0"/>
+              <a:t>In Lean, we might write:</a:t>
+            </a:r>
+          </a:p>
+          <a:p>
+            <a:pPr marL="0" indent="0">
+              <a:buNone/>
+            </a:pPr>
+            <a:r>
+              <a:rPr lang="en-US" sz="2400" dirty="0">
+                <a:latin typeface="Courier New" panose="02070309020205020404" pitchFamily="49" charset="0"/>
+                <a:cs typeface="Courier New" panose="02070309020205020404" pitchFamily="49" charset="0"/>
+              </a:rPr>
+              <a:t>  def </a:t>
+            </a:r>
+            <a:r>
+              <a:rPr lang="en-US" sz="2400" dirty="0" err="1">
+                <a:latin typeface="Courier New" panose="02070309020205020404" pitchFamily="49" charset="0"/>
+                <a:cs typeface="Courier New" panose="02070309020205020404" pitchFamily="49" charset="0"/>
+              </a:rPr>
+              <a:t>anExistsProp</a:t>
+            </a:r>
+            <a:r>
+              <a:rPr lang="en-US" sz="2400" dirty="0">
+                <a:latin typeface="Courier New" panose="02070309020205020404" pitchFamily="49" charset="0"/>
+                <a:cs typeface="Courier New" panose="02070309020205020404" pitchFamily="49" charset="0"/>
+              </a:rPr>
+              <a:t> := </a:t>
+            </a:r>
+          </a:p>
+          <a:p>
+            <a:pPr marL="0" indent="0">
+              <a:buNone/>
+            </a:pPr>
+            <a:r>
+              <a:rPr lang="en-US" sz="2400" dirty="0">
+                <a:latin typeface="Courier New" panose="02070309020205020404" pitchFamily="49" charset="0"/>
+                <a:cs typeface="Courier New" panose="02070309020205020404" pitchFamily="49" charset="0"/>
+              </a:rPr>
+              <a:t>    exists m, m + m = 8</a:t>
+            </a:r>
+          </a:p>
+          <a:p>
+            <a:r>
+              <a:rPr lang="en-US" dirty="0"/>
+              <a:t>Or:</a:t>
+            </a:r>
+          </a:p>
+          <a:p>
+            <a:pPr marL="0" indent="0">
+              <a:buNone/>
+            </a:pPr>
+            <a:r>
+              <a:rPr lang="en-US" sz="2400" dirty="0">
+                <a:latin typeface="Courier New" panose="02070309020205020404" pitchFamily="49" charset="0"/>
+                <a:cs typeface="Courier New" panose="02070309020205020404" pitchFamily="49" charset="0"/>
+              </a:rPr>
+              <a:t>  def </a:t>
+            </a:r>
+            <a:r>
+              <a:rPr lang="en-US" sz="2400" dirty="0" err="1">
+                <a:latin typeface="Courier New" panose="02070309020205020404" pitchFamily="49" charset="0"/>
+                <a:cs typeface="Courier New" panose="02070309020205020404" pitchFamily="49" charset="0"/>
+              </a:rPr>
+              <a:t>anotherExistsProp</a:t>
+            </a:r>
+            <a:r>
+              <a:rPr lang="en-US" sz="2400" dirty="0">
+                <a:latin typeface="Courier New" panose="02070309020205020404" pitchFamily="49" charset="0"/>
+                <a:cs typeface="Courier New" panose="02070309020205020404" pitchFamily="49" charset="0"/>
+              </a:rPr>
+              <a:t> := </a:t>
+            </a:r>
+          </a:p>
+          <a:p>
+            <a:pPr marL="0" indent="0">
+              <a:buNone/>
+            </a:pPr>
+            <a:r>
+              <a:rPr lang="en-US" sz="2400" dirty="0">
+                <a:latin typeface="Courier New" panose="02070309020205020404" pitchFamily="49" charset="0"/>
+                <a:cs typeface="Courier New" panose="02070309020205020404" pitchFamily="49" charset="0"/>
+              </a:rPr>
+              <a:t>    exists m, m &gt; 10</a:t>
+            </a:r>
+          </a:p>
+          <a:p>
+            <a:pPr marL="0" indent="0">
+              <a:buNone/>
+            </a:pPr>
+            <a:r>
+              <a:rPr lang="en-US" sz="2400" dirty="0">
+                <a:latin typeface="Courier New" panose="02070309020205020404" pitchFamily="49" charset="0"/>
+                <a:cs typeface="Courier New" panose="02070309020205020404" pitchFamily="49" charset="0"/>
+              </a:rPr>
+              <a:t>  def </a:t>
+            </a:r>
+            <a:r>
+              <a:rPr lang="en-US" sz="2400" dirty="0" err="1">
+                <a:latin typeface="Courier New" panose="02070309020205020404" pitchFamily="49" charset="0"/>
+                <a:cs typeface="Courier New" panose="02070309020205020404" pitchFamily="49" charset="0"/>
+              </a:rPr>
+              <a:t>yetAnotherExistsProp</a:t>
+            </a:r>
+            <a:r>
+              <a:rPr lang="en-US" sz="2400" dirty="0">
+                <a:latin typeface="Courier New" panose="02070309020205020404" pitchFamily="49" charset="0"/>
+                <a:cs typeface="Courier New" panose="02070309020205020404" pitchFamily="49" charset="0"/>
+              </a:rPr>
+              <a:t> :=</a:t>
+            </a:r>
+          </a:p>
+          <a:p>
+            <a:pPr marL="0" indent="0">
+              <a:buNone/>
+            </a:pPr>
+            <a:r>
+              <a:rPr lang="en-US" sz="2400" dirty="0">
+                <a:latin typeface="Courier New" panose="02070309020205020404" pitchFamily="49" charset="0"/>
+                <a:cs typeface="Courier New" panose="02070309020205020404" pitchFamily="49" charset="0"/>
+              </a:rPr>
+              <a:t>    exists m, m - m = 3</a:t>
+            </a:r>
+          </a:p>
+          <a:p>
+            <a:endParaRPr lang="en-US" dirty="0"/>
+          </a:p>
+          <a:p>
+            <a:pPr marL="0" indent="0">
+              <a:buNone/>
+            </a:pPr>
+            <a:endParaRPr lang="en-US" dirty="0"/>
+          </a:p>
+          <a:p>
+            <a:endParaRPr lang="en-US" dirty="0"/>
+          </a:p>
+          <a:p>
+            <a:pPr lvl="1"/>
+            <a:endParaRPr lang="en-US" dirty="0"/>
+          </a:p>
+        </p:txBody>
+      </p:sp>
+      <p:sp>
+        <p:nvSpPr>
+          <p:cNvPr id="4" name="Slide Number Placeholder 3">
+            <a:extLst>
+              <a:ext uri="{FF2B5EF4-FFF2-40B4-BE49-F238E27FC236}">
+                <a16:creationId xmlns:a16="http://schemas.microsoft.com/office/drawing/2014/main" id="{8BA586D8-2005-074F-AA33-A27B1604B577}"/>
+              </a:ext>
+            </a:extLst>
+          </p:cNvPr>
+          <p:cNvSpPr>
+            <a:spLocks noGrp="1"/>
+          </p:cNvSpPr>
+          <p:nvPr>
+            <p:ph type="sldNum" sz="quarter" idx="12"/>
+          </p:nvPr>
+        </p:nvSpPr>
+        <p:spPr/>
+        <p:txBody>
+          <a:bodyPr/>
+          <a:lstStyle/>
+          <a:p>
+            <a:fld id="{3352CBF5-17B8-4387-88A6-ABF9F8C64D5A}" type="slidenum">
+              <a:rPr lang="en-US" smtClean="0"/>
+              <a:t>2</a:t>
+            </a:fld>
+            <a:endParaRPr lang="en-US"/>
+          </a:p>
+        </p:txBody>
+      </p:sp>
+    </p:spTree>
+    <p:extLst>
+      <p:ext uri="{BB962C8B-B14F-4D97-AF65-F5344CB8AC3E}">
+        <p14:creationId xmlns:p14="http://schemas.microsoft.com/office/powerpoint/2010/main" val="972595728"/>
+      </p:ext>
+    </p:extLst>
+  </p:cSld>
+  <p:clrMapOvr>
+    <a:masterClrMapping/>
+  </p:clrMapOvr>
+</p:sld>
+</file>
+
+<file path=ppt/slides/slide20.xml><?xml version="1.0" encoding="utf-8"?>
+<p:sld xmlns:a="http://schemas.openxmlformats.org/drawingml/2006/main" xmlns:r="http://schemas.openxmlformats.org/officeDocument/2006/relationships" xmlns:p="http://schemas.openxmlformats.org/presentationml/2006/main">
+  <p:cSld>
     <p:bg>
       <p:bgPr>
         <a:solidFill>
@@ -6013,7 +7068,7 @@
           <a:p>
             <a:fld id="{3352CBF5-17B8-4387-88A6-ABF9F8C64D5A}" type="slidenum">
               <a:rPr lang="en-US" smtClean="0"/>
-              <a:t>17</a:t>
+              <a:t>20</a:t>
             </a:fld>
             <a:endParaRPr lang="en-US"/>
           </a:p>
@@ -6023,315 +7078,6 @@
     <p:extLst>
       <p:ext uri="{BB962C8B-B14F-4D97-AF65-F5344CB8AC3E}">
         <p14:creationId xmlns:p14="http://schemas.microsoft.com/office/powerpoint/2010/main" val="628979899"/>
-      </p:ext>
-    </p:extLst>
-  </p:cSld>
-  <p:clrMapOvr>
-    <a:masterClrMapping/>
-  </p:clrMapOvr>
-</p:sld>
-</file>
-
-<file path=ppt/slides/slide2.xml><?xml version="1.0" encoding="utf-8"?>
-<p:sld xmlns:a="http://schemas.openxmlformats.org/drawingml/2006/main" xmlns:r="http://schemas.openxmlformats.org/officeDocument/2006/relationships" xmlns:p="http://schemas.openxmlformats.org/presentationml/2006/main">
-  <p:cSld>
-    <p:spTree>
-      <p:nvGrpSpPr>
-        <p:cNvPr id="1" name=""/>
-        <p:cNvGrpSpPr/>
-        <p:nvPr/>
-      </p:nvGrpSpPr>
-      <p:grpSpPr>
-        <a:xfrm>
-          <a:off x="0" y="0"/>
-          <a:ext cx="0" cy="0"/>
-          <a:chOff x="0" y="0"/>
-          <a:chExt cx="0" cy="0"/>
-        </a:xfrm>
-      </p:grpSpPr>
-      <p:sp>
-        <p:nvSpPr>
-          <p:cNvPr id="2" name="Title 1">
-            <a:extLst>
-              <a:ext uri="{FF2B5EF4-FFF2-40B4-BE49-F238E27FC236}">
-                <a16:creationId xmlns:a16="http://schemas.microsoft.com/office/drawing/2014/main" id="{2B419016-63A1-804E-A64E-506D76FDB939}"/>
-              </a:ext>
-            </a:extLst>
-          </p:cNvPr>
-          <p:cNvSpPr>
-            <a:spLocks noGrp="1"/>
-          </p:cNvSpPr>
-          <p:nvPr>
-            <p:ph type="title"/>
-          </p:nvPr>
-        </p:nvSpPr>
-        <p:spPr/>
-        <p:txBody>
-          <a:bodyPr/>
-          <a:lstStyle/>
-          <a:p>
-            <a:r>
-              <a:rPr lang="en-US" dirty="0"/>
-              <a:t>What is Existential Quantification?</a:t>
-            </a:r>
-          </a:p>
-        </p:txBody>
-      </p:sp>
-      <p:sp>
-        <p:nvSpPr>
-          <p:cNvPr id="3" name="Content Placeholder 2">
-            <a:extLst>
-              <a:ext uri="{FF2B5EF4-FFF2-40B4-BE49-F238E27FC236}">
-                <a16:creationId xmlns:a16="http://schemas.microsoft.com/office/drawing/2014/main" id="{9949A817-3AC3-E444-8ACB-8FC21F690AAB}"/>
-              </a:ext>
-            </a:extLst>
-          </p:cNvPr>
-          <p:cNvSpPr>
-            <a:spLocks noGrp="1"/>
-          </p:cNvSpPr>
-          <p:nvPr>
-            <p:ph idx="1"/>
-          </p:nvPr>
-        </p:nvSpPr>
-        <p:spPr>
-          <a:xfrm>
-            <a:off x="838200" y="1825624"/>
-            <a:ext cx="10515600" cy="4530725"/>
-          </a:xfrm>
-        </p:spPr>
-        <p:txBody>
-          <a:bodyPr>
-            <a:normAutofit fontScale="85000" lnSpcReduction="20000"/>
-          </a:bodyPr>
-          <a:lstStyle/>
-          <a:p>
-            <a:r>
-              <a:rPr lang="en-US" dirty="0"/>
-              <a:t>An existentially quantified proposition asserts that there is some value of some type for which some proposition involving that value is true. Here are a couple of examples:</a:t>
-            </a:r>
-          </a:p>
-          <a:p>
-            <a:pPr lvl="1"/>
-            <a:r>
-              <a:rPr lang="en-US" dirty="0"/>
-              <a:t>∃ m ∈ </a:t>
-            </a:r>
-            <a:r>
-              <a:rPr lang="en-US" dirty="0" err="1"/>
-              <a:t>ℕ</a:t>
-            </a:r>
-            <a:r>
-              <a:rPr lang="en-US" dirty="0"/>
-              <a:t>, m + m = 8</a:t>
-            </a:r>
-          </a:p>
-          <a:p>
-            <a:pPr lvl="1"/>
-            <a:r>
-              <a:rPr lang="en-US" dirty="0"/>
-              <a:t>∃ m ∈ </a:t>
-            </a:r>
-            <a:r>
-              <a:rPr lang="en-US" dirty="0" err="1"/>
-              <a:t>ℕ</a:t>
-            </a:r>
-            <a:r>
-              <a:rPr lang="en-US" dirty="0"/>
-              <a:t>, m &gt; 10</a:t>
-            </a:r>
-          </a:p>
-          <a:p>
-            <a:pPr lvl="1"/>
-            <a:r>
-              <a:rPr lang="en-US" dirty="0"/>
-              <a:t>∃ m ∈ </a:t>
-            </a:r>
-            <a:r>
-              <a:rPr lang="en-US" dirty="0" err="1"/>
-              <a:t>ℕ</a:t>
-            </a:r>
-            <a:r>
-              <a:rPr lang="en-US" dirty="0"/>
-              <a:t>, m - m = 3</a:t>
-            </a:r>
-          </a:p>
-          <a:p>
-            <a:r>
-              <a:rPr lang="en-US" dirty="0"/>
-              <a:t>In Lean, we might write:</a:t>
-            </a:r>
-          </a:p>
-          <a:p>
-            <a:pPr marL="0" indent="0">
-              <a:buNone/>
-            </a:pPr>
-            <a:r>
-              <a:rPr lang="en-US" sz="2400" dirty="0">
-                <a:latin typeface="Courier New" panose="02070309020205020404" pitchFamily="49" charset="0"/>
-                <a:cs typeface="Courier New" panose="02070309020205020404" pitchFamily="49" charset="0"/>
-              </a:rPr>
-              <a:t>  def </a:t>
-            </a:r>
-            <a:r>
-              <a:rPr lang="en-US" sz="2400" dirty="0" err="1">
-                <a:latin typeface="Courier New" panose="02070309020205020404" pitchFamily="49" charset="0"/>
-                <a:cs typeface="Courier New" panose="02070309020205020404" pitchFamily="49" charset="0"/>
-              </a:rPr>
-              <a:t>anExistsProp</a:t>
-            </a:r>
-            <a:r>
-              <a:rPr lang="en-US" sz="2400" dirty="0">
-                <a:latin typeface="Courier New" panose="02070309020205020404" pitchFamily="49" charset="0"/>
-                <a:cs typeface="Courier New" panose="02070309020205020404" pitchFamily="49" charset="0"/>
-              </a:rPr>
-              <a:t> := </a:t>
-            </a:r>
-          </a:p>
-          <a:p>
-            <a:pPr marL="0" indent="0">
-              <a:buNone/>
-            </a:pPr>
-            <a:r>
-              <a:rPr lang="en-US" sz="2400" dirty="0">
-                <a:latin typeface="Courier New" panose="02070309020205020404" pitchFamily="49" charset="0"/>
-                <a:cs typeface="Courier New" panose="02070309020205020404" pitchFamily="49" charset="0"/>
-              </a:rPr>
-              <a:t>    exists m, m + m = 8</a:t>
-            </a:r>
-          </a:p>
-          <a:p>
-            <a:r>
-              <a:rPr lang="en-US" dirty="0"/>
-              <a:t>Or:</a:t>
-            </a:r>
-          </a:p>
-          <a:p>
-            <a:pPr marL="0" indent="0">
-              <a:buNone/>
-            </a:pPr>
-            <a:r>
-              <a:rPr lang="en-US" sz="2400" dirty="0">
-                <a:latin typeface="Courier New" panose="02070309020205020404" pitchFamily="49" charset="0"/>
-                <a:cs typeface="Courier New" panose="02070309020205020404" pitchFamily="49" charset="0"/>
-              </a:rPr>
-              <a:t>  def </a:t>
-            </a:r>
-            <a:r>
-              <a:rPr lang="en-US" sz="2400" dirty="0" err="1">
-                <a:latin typeface="Courier New" panose="02070309020205020404" pitchFamily="49" charset="0"/>
-                <a:cs typeface="Courier New" panose="02070309020205020404" pitchFamily="49" charset="0"/>
-              </a:rPr>
-              <a:t>anotherExistsProp</a:t>
-            </a:r>
-            <a:r>
-              <a:rPr lang="en-US" sz="2400" dirty="0">
-                <a:latin typeface="Courier New" panose="02070309020205020404" pitchFamily="49" charset="0"/>
-                <a:cs typeface="Courier New" panose="02070309020205020404" pitchFamily="49" charset="0"/>
-              </a:rPr>
-              <a:t> := </a:t>
-            </a:r>
-          </a:p>
-          <a:p>
-            <a:pPr marL="0" indent="0">
-              <a:buNone/>
-            </a:pPr>
-            <a:r>
-              <a:rPr lang="en-US" sz="2400" dirty="0">
-                <a:latin typeface="Courier New" panose="02070309020205020404" pitchFamily="49" charset="0"/>
-                <a:cs typeface="Courier New" panose="02070309020205020404" pitchFamily="49" charset="0"/>
-              </a:rPr>
-              <a:t>    exists m, m &gt; 10</a:t>
-            </a:r>
-          </a:p>
-          <a:p>
-            <a:pPr marL="0" indent="0">
-              <a:buNone/>
-            </a:pPr>
-            <a:r>
-              <a:rPr lang="en-US" sz="2400" dirty="0">
-                <a:latin typeface="Courier New" panose="02070309020205020404" pitchFamily="49" charset="0"/>
-                <a:cs typeface="Courier New" panose="02070309020205020404" pitchFamily="49" charset="0"/>
-              </a:rPr>
-              <a:t>  def </a:t>
-            </a:r>
-            <a:r>
-              <a:rPr lang="en-US" sz="2400" dirty="0" err="1">
-                <a:latin typeface="Courier New" panose="02070309020205020404" pitchFamily="49" charset="0"/>
-                <a:cs typeface="Courier New" panose="02070309020205020404" pitchFamily="49" charset="0"/>
-              </a:rPr>
-              <a:t>yetAnotherExistsProp</a:t>
-            </a:r>
-            <a:r>
-              <a:rPr lang="en-US" sz="2400" dirty="0">
-                <a:latin typeface="Courier New" panose="02070309020205020404" pitchFamily="49" charset="0"/>
-                <a:cs typeface="Courier New" panose="02070309020205020404" pitchFamily="49" charset="0"/>
-              </a:rPr>
-              <a:t> :=</a:t>
-            </a:r>
-          </a:p>
-          <a:p>
-            <a:pPr marL="0" indent="0">
-              <a:buNone/>
-            </a:pPr>
-            <a:r>
-              <a:rPr lang="en-US" sz="2400" dirty="0">
-                <a:latin typeface="Courier New" panose="02070309020205020404" pitchFamily="49" charset="0"/>
-                <a:cs typeface="Courier New" panose="02070309020205020404" pitchFamily="49" charset="0"/>
-              </a:rPr>
-              <a:t>    exists m, m - m = 3</a:t>
-            </a:r>
-          </a:p>
-          <a:p>
-            <a:endParaRPr lang="en-US" dirty="0"/>
-          </a:p>
-          <a:p>
-            <a:pPr marL="0" indent="0">
-              <a:buNone/>
-            </a:pPr>
-            <a:endParaRPr lang="en-US" dirty="0"/>
-          </a:p>
-          <a:p>
-            <a:endParaRPr lang="en-US" dirty="0"/>
-          </a:p>
-          <a:p>
-            <a:pPr lvl="1"/>
-            <a:endParaRPr lang="en-US" dirty="0"/>
-          </a:p>
-        </p:txBody>
-      </p:sp>
-      <p:sp>
-        <p:nvSpPr>
-          <p:cNvPr id="4" name="Slide Number Placeholder 3">
-            <a:extLst>
-              <a:ext uri="{FF2B5EF4-FFF2-40B4-BE49-F238E27FC236}">
-                <a16:creationId xmlns:a16="http://schemas.microsoft.com/office/drawing/2014/main" id="{8BA586D8-2005-074F-AA33-A27B1604B577}"/>
-              </a:ext>
-            </a:extLst>
-          </p:cNvPr>
-          <p:cNvSpPr>
-            <a:spLocks noGrp="1"/>
-          </p:cNvSpPr>
-          <p:nvPr>
-            <p:ph type="sldNum" sz="quarter" idx="12"/>
-          </p:nvPr>
-        </p:nvSpPr>
-        <p:spPr/>
-        <p:txBody>
-          <a:bodyPr/>
-          <a:lstStyle/>
-          <a:p>
-            <a:fld id="{3352CBF5-17B8-4387-88A6-ABF9F8C64D5A}" type="slidenum">
-              <a:rPr lang="en-US" smtClean="0"/>
-              <a:t>2</a:t>
-            </a:fld>
-            <a:endParaRPr lang="en-US"/>
-          </a:p>
-        </p:txBody>
-      </p:sp>
-    </p:spTree>
-    <p:extLst>
-      <p:ext uri="{BB962C8B-B14F-4D97-AF65-F5344CB8AC3E}">
-        <p14:creationId xmlns:p14="http://schemas.microsoft.com/office/powerpoint/2010/main" val="972595728"/>
       </p:ext>
     </p:extLst>
   </p:cSld>

</xml_diff>

<commit_message>
Completed proof for negating existential quantification
</commit_message>
<xml_diff>
--- a/11_Existential_Quantification/Exists.pptx
+++ b/11_Existential_Quantification/Exists.pptx
@@ -5,7 +5,7 @@
     <p:sldMasterId id="2147483648" r:id="rId1"/>
   </p:sldMasterIdLst>
   <p:notesMasterIdLst>
-    <p:notesMasterId r:id="rId22"/>
+    <p:notesMasterId r:id="rId23"/>
   </p:notesMasterIdLst>
   <p:sldIdLst>
     <p:sldId id="258" r:id="rId2"/>
@@ -27,7 +27,8 @@
     <p:sldId id="371" r:id="rId18"/>
     <p:sldId id="372" r:id="rId19"/>
     <p:sldId id="373" r:id="rId20"/>
-    <p:sldId id="261" r:id="rId21"/>
+    <p:sldId id="374" r:id="rId21"/>
+    <p:sldId id="261" r:id="rId22"/>
   </p:sldIdLst>
   <p:sldSz cx="12192000" cy="6858000"/>
   <p:notesSz cx="6858000" cy="9144000"/>
@@ -6182,7 +6183,7 @@
           <a:p>
             <a:r>
               <a:rPr lang="en-US" dirty="0"/>
-              <a:t>Proof of Existential Negation</a:t>
+              <a:t>Proof of Existential Negation (1 of 2)</a:t>
             </a:r>
           </a:p>
         </p:txBody>
@@ -6256,7 +6257,7 @@
                 <a:latin typeface="Courier New" panose="02070309020205020404" pitchFamily="49" charset="0"/>
                 <a:cs typeface="Courier New" panose="02070309020205020404" pitchFamily="49" charset="0"/>
               </a:rPr>
-              <a:t>    (¬(∃ t: T, pred(t))) →</a:t>
+              <a:t>    (¬(∃ t: T, pred(t))) ↔</a:t>
             </a:r>
           </a:p>
           <a:p>
@@ -6304,13 +6305,39 @@
                 <a:latin typeface="Courier New" panose="02070309020205020404" pitchFamily="49" charset="0"/>
                 <a:cs typeface="Courier New" panose="02070309020205020404" pitchFamily="49" charset="0"/>
               </a:rPr>
-              <a:t>  assume </a:t>
+              <a:t>  apply </a:t>
             </a:r>
             <a:r>
               <a:rPr lang="en-US" dirty="0" err="1">
                 <a:latin typeface="Courier New" panose="02070309020205020404" pitchFamily="49" charset="0"/>
                 <a:cs typeface="Courier New" panose="02070309020205020404" pitchFamily="49" charset="0"/>
               </a:rPr>
+              <a:t>iff.intro</a:t>
+            </a:r>
+            <a:r>
+              <a:rPr lang="en-US" dirty="0">
+                <a:latin typeface="Courier New" panose="02070309020205020404" pitchFamily="49" charset="0"/>
+                <a:cs typeface="Courier New" panose="02070309020205020404" pitchFamily="49" charset="0"/>
+              </a:rPr>
+              <a:t>,</a:t>
+            </a:r>
+          </a:p>
+          <a:p>
+            <a:pPr marL="0" indent="0">
+              <a:buNone/>
+            </a:pPr>
+            <a:r>
+              <a:rPr lang="en-US" dirty="0">
+                <a:latin typeface="Courier New" panose="02070309020205020404" pitchFamily="49" charset="0"/>
+                <a:cs typeface="Courier New" panose="02070309020205020404" pitchFamily="49" charset="0"/>
+              </a:rPr>
+              <a:t>    assume </a:t>
+            </a:r>
+            <a:r>
+              <a:rPr lang="en-US" dirty="0" err="1">
+                <a:latin typeface="Courier New" panose="02070309020205020404" pitchFamily="49" charset="0"/>
+                <a:cs typeface="Courier New" panose="02070309020205020404" pitchFamily="49" charset="0"/>
+              </a:rPr>
               <a:t>pf_not_exists_t</a:t>
             </a:r>
             <a:r>
@@ -6330,31 +6357,31 @@
                 <a:latin typeface="Courier New" panose="02070309020205020404" pitchFamily="49" charset="0"/>
                 <a:cs typeface="Courier New" panose="02070309020205020404" pitchFamily="49" charset="0"/>
               </a:rPr>
-              <a:t>  assume t,</a:t>
-            </a:r>
-          </a:p>
-          <a:p>
-            <a:pPr marL="0" indent="0">
-              <a:buNone/>
-            </a:pPr>
-            <a:r>
-              <a:rPr lang="en-US" dirty="0">
-                <a:latin typeface="Courier New" panose="02070309020205020404" pitchFamily="49" charset="0"/>
-                <a:cs typeface="Courier New" panose="02070309020205020404" pitchFamily="49" charset="0"/>
-              </a:rPr>
-              <a:t>  assume Q,</a:t>
-            </a:r>
-          </a:p>
-          <a:p>
-            <a:pPr marL="0" indent="0">
-              <a:buNone/>
-            </a:pPr>
-            <a:r>
-              <a:rPr lang="en-US" dirty="0">
-                <a:latin typeface="Courier New" panose="02070309020205020404" pitchFamily="49" charset="0"/>
-                <a:cs typeface="Courier New" panose="02070309020205020404" pitchFamily="49" charset="0"/>
-              </a:rPr>
-              <a:t>  have </a:t>
+              <a:t>    assume t,</a:t>
+            </a:r>
+          </a:p>
+          <a:p>
+            <a:pPr marL="0" indent="0">
+              <a:buNone/>
+            </a:pPr>
+            <a:r>
+              <a:rPr lang="en-US" dirty="0">
+                <a:latin typeface="Courier New" panose="02070309020205020404" pitchFamily="49" charset="0"/>
+                <a:cs typeface="Courier New" panose="02070309020205020404" pitchFamily="49" charset="0"/>
+              </a:rPr>
+              <a:t>    assume Q,</a:t>
+            </a:r>
+          </a:p>
+          <a:p>
+            <a:pPr marL="0" indent="0">
+              <a:buNone/>
+            </a:pPr>
+            <a:r>
+              <a:rPr lang="en-US" dirty="0">
+                <a:latin typeface="Courier New" panose="02070309020205020404" pitchFamily="49" charset="0"/>
+                <a:cs typeface="Courier New" panose="02070309020205020404" pitchFamily="49" charset="0"/>
+              </a:rPr>
+              <a:t>    have </a:t>
             </a:r>
             <a:r>
               <a:rPr lang="en-US" dirty="0" err="1">
@@ -6390,18 +6417,11 @@
               <a:buNone/>
             </a:pPr>
             <a:r>
-              <a:rPr lang="en-US">
-                <a:latin typeface="Courier New" panose="02070309020205020404" pitchFamily="49" charset="0"/>
-                <a:cs typeface="Courier New" panose="02070309020205020404" pitchFamily="49" charset="0"/>
-              </a:rPr>
-              <a:t>  exact </a:t>
-            </a:r>
-            <a:r>
-              <a:rPr lang="en-US" dirty="0">
-                <a:latin typeface="Courier New" panose="02070309020205020404" pitchFamily="49" charset="0"/>
-                <a:cs typeface="Courier New" panose="02070309020205020404" pitchFamily="49" charset="0"/>
-              </a:rPr>
-              <a:t>(</a:t>
+              <a:rPr lang="en-US" dirty="0">
+                <a:latin typeface="Courier New" panose="02070309020205020404" pitchFamily="49" charset="0"/>
+                <a:cs typeface="Courier New" panose="02070309020205020404" pitchFamily="49" charset="0"/>
+              </a:rPr>
+              <a:t>    exact (</a:t>
             </a:r>
             <a:r>
               <a:rPr lang="en-US" dirty="0" err="1">
@@ -6429,20 +6449,17 @@
                 <a:latin typeface="Courier New" panose="02070309020205020404" pitchFamily="49" charset="0"/>
                 <a:cs typeface="Courier New" panose="02070309020205020404" pitchFamily="49" charset="0"/>
               </a:rPr>
-              <a:t>)</a:t>
-            </a:r>
-          </a:p>
-          <a:p>
-            <a:pPr marL="0" indent="0">
-              <a:buNone/>
-            </a:pPr>
-            <a:r>
-              <a:rPr lang="en-US" dirty="0">
-                <a:latin typeface="Courier New" panose="02070309020205020404" pitchFamily="49" charset="0"/>
-                <a:cs typeface="Courier New" panose="02070309020205020404" pitchFamily="49" charset="0"/>
-              </a:rPr>
-              <a:t>end</a:t>
-            </a:r>
+              <a:t>)…</a:t>
+            </a:r>
+          </a:p>
+          <a:p>
+            <a:pPr marL="0" indent="0">
+              <a:buNone/>
+            </a:pPr>
+            <a:endParaRPr lang="en-US" dirty="0">
+              <a:latin typeface="Courier New" panose="02070309020205020404" pitchFamily="49" charset="0"/>
+              <a:cs typeface="Courier New" panose="02070309020205020404" pitchFamily="49" charset="0"/>
+            </a:endParaRPr>
           </a:p>
         </p:txBody>
       </p:sp>
@@ -6798,6 +6815,348 @@
 </file>
 
 <file path=ppt/slides/slide20.xml><?xml version="1.0" encoding="utf-8"?>
+<p:sld xmlns:a="http://schemas.openxmlformats.org/drawingml/2006/main" xmlns:r="http://schemas.openxmlformats.org/officeDocument/2006/relationships" xmlns:p="http://schemas.openxmlformats.org/presentationml/2006/main">
+  <p:cSld>
+    <p:spTree>
+      <p:nvGrpSpPr>
+        <p:cNvPr id="1" name=""/>
+        <p:cNvGrpSpPr/>
+        <p:nvPr/>
+      </p:nvGrpSpPr>
+      <p:grpSpPr>
+        <a:xfrm>
+          <a:off x="0" y="0"/>
+          <a:ext cx="0" cy="0"/>
+          <a:chOff x="0" y="0"/>
+          <a:chExt cx="0" cy="0"/>
+        </a:xfrm>
+      </p:grpSpPr>
+      <p:sp>
+        <p:nvSpPr>
+          <p:cNvPr id="2" name="Title 1">
+            <a:extLst>
+              <a:ext uri="{FF2B5EF4-FFF2-40B4-BE49-F238E27FC236}">
+                <a16:creationId xmlns:a16="http://schemas.microsoft.com/office/drawing/2014/main" id="{8F8FAD85-671B-7241-BC2A-30F84037BAC4}"/>
+              </a:ext>
+            </a:extLst>
+          </p:cNvPr>
+          <p:cNvSpPr>
+            <a:spLocks noGrp="1"/>
+          </p:cNvSpPr>
+          <p:nvPr>
+            <p:ph type="title"/>
+          </p:nvPr>
+        </p:nvSpPr>
+        <p:spPr/>
+        <p:txBody>
+          <a:bodyPr/>
+          <a:lstStyle/>
+          <a:p>
+            <a:r>
+              <a:rPr lang="en-US" dirty="0"/>
+              <a:t>Proof of Existential Negation (2 of 2)</a:t>
+            </a:r>
+          </a:p>
+        </p:txBody>
+      </p:sp>
+      <p:sp>
+        <p:nvSpPr>
+          <p:cNvPr id="3" name="Content Placeholder 2">
+            <a:extLst>
+              <a:ext uri="{FF2B5EF4-FFF2-40B4-BE49-F238E27FC236}">
+                <a16:creationId xmlns:a16="http://schemas.microsoft.com/office/drawing/2014/main" id="{55DF2511-E4F1-4644-B21C-993FD1EDDEB6}"/>
+              </a:ext>
+            </a:extLst>
+          </p:cNvPr>
+          <p:cNvSpPr>
+            <a:spLocks noGrp="1"/>
+          </p:cNvSpPr>
+          <p:nvPr>
+            <p:ph idx="1"/>
+          </p:nvPr>
+        </p:nvSpPr>
+        <p:spPr/>
+        <p:txBody>
+          <a:bodyPr>
+            <a:normAutofit lnSpcReduction="10000"/>
+          </a:bodyPr>
+          <a:lstStyle/>
+          <a:p>
+            <a:pPr marL="0" indent="0">
+              <a:buNone/>
+            </a:pPr>
+            <a:r>
+              <a:rPr lang="en-US" dirty="0">
+                <a:latin typeface="Courier New" panose="02070309020205020404" pitchFamily="49" charset="0"/>
+                <a:cs typeface="Courier New" panose="02070309020205020404" pitchFamily="49" charset="0"/>
+              </a:rPr>
+              <a:t>    -- proof that ∀ t: T, ¬pred(t) implies</a:t>
+            </a:r>
+          </a:p>
+          <a:p>
+            <a:pPr marL="0" indent="0">
+              <a:buNone/>
+            </a:pPr>
+            <a:r>
+              <a:rPr lang="en-US" dirty="0">
+                <a:latin typeface="Courier New" panose="02070309020205020404" pitchFamily="49" charset="0"/>
+                <a:cs typeface="Courier New" panose="02070309020205020404" pitchFamily="49" charset="0"/>
+              </a:rPr>
+              <a:t>    -- ¬(∃ t: T, pred(t))</a:t>
+            </a:r>
+          </a:p>
+          <a:p>
+            <a:pPr marL="0" indent="0">
+              <a:buNone/>
+            </a:pPr>
+            <a:r>
+              <a:rPr lang="en-US" dirty="0">
+                <a:latin typeface="Courier New" panose="02070309020205020404" pitchFamily="49" charset="0"/>
+                <a:cs typeface="Courier New" panose="02070309020205020404" pitchFamily="49" charset="0"/>
+              </a:rPr>
+              <a:t>    assume </a:t>
+            </a:r>
+            <a:r>
+              <a:rPr lang="en-US" dirty="0" err="1">
+                <a:latin typeface="Courier New" panose="02070309020205020404" pitchFamily="49" charset="0"/>
+                <a:cs typeface="Courier New" panose="02070309020205020404" pitchFamily="49" charset="0"/>
+              </a:rPr>
+              <a:t>pf_forall_t_not</a:t>
+            </a:r>
+            <a:r>
+              <a:rPr lang="en-US" dirty="0">
+                <a:latin typeface="Courier New" panose="02070309020205020404" pitchFamily="49" charset="0"/>
+                <a:cs typeface="Courier New" panose="02070309020205020404" pitchFamily="49" charset="0"/>
+              </a:rPr>
+              <a:t>,</a:t>
+            </a:r>
+          </a:p>
+          <a:p>
+            <a:pPr marL="0" indent="0">
+              <a:buNone/>
+            </a:pPr>
+            <a:r>
+              <a:rPr lang="en-US" dirty="0">
+                <a:latin typeface="Courier New" panose="02070309020205020404" pitchFamily="49" charset="0"/>
+                <a:cs typeface="Courier New" panose="02070309020205020404" pitchFamily="49" charset="0"/>
+              </a:rPr>
+              <a:t>    assume </a:t>
+            </a:r>
+            <a:r>
+              <a:rPr lang="en-US" dirty="0" err="1">
+                <a:latin typeface="Courier New" panose="02070309020205020404" pitchFamily="49" charset="0"/>
+                <a:cs typeface="Courier New" panose="02070309020205020404" pitchFamily="49" charset="0"/>
+              </a:rPr>
+              <a:t>pf_not_exists_t</a:t>
+            </a:r>
+            <a:r>
+              <a:rPr lang="en-US" dirty="0">
+                <a:latin typeface="Courier New" panose="02070309020205020404" pitchFamily="49" charset="0"/>
+                <a:cs typeface="Courier New" panose="02070309020205020404" pitchFamily="49" charset="0"/>
+              </a:rPr>
+              <a:t>,</a:t>
+            </a:r>
+          </a:p>
+          <a:p>
+            <a:pPr marL="0" indent="0">
+              <a:buNone/>
+            </a:pPr>
+            <a:r>
+              <a:rPr lang="en-US" dirty="0">
+                <a:latin typeface="Courier New" panose="02070309020205020404" pitchFamily="49" charset="0"/>
+                <a:cs typeface="Courier New" panose="02070309020205020404" pitchFamily="49" charset="0"/>
+              </a:rPr>
+              <a:t>    apply </a:t>
+            </a:r>
+            <a:r>
+              <a:rPr lang="en-US" dirty="0" err="1">
+                <a:latin typeface="Courier New" panose="02070309020205020404" pitchFamily="49" charset="0"/>
+                <a:cs typeface="Courier New" panose="02070309020205020404" pitchFamily="49" charset="0"/>
+              </a:rPr>
+              <a:t>exists.elim</a:t>
+            </a:r>
+            <a:r>
+              <a:rPr lang="en-US" dirty="0">
+                <a:latin typeface="Courier New" panose="02070309020205020404" pitchFamily="49" charset="0"/>
+                <a:cs typeface="Courier New" panose="02070309020205020404" pitchFamily="49" charset="0"/>
+              </a:rPr>
+              <a:t> </a:t>
+            </a:r>
+            <a:r>
+              <a:rPr lang="en-US" dirty="0" err="1">
+                <a:latin typeface="Courier New" panose="02070309020205020404" pitchFamily="49" charset="0"/>
+                <a:cs typeface="Courier New" panose="02070309020205020404" pitchFamily="49" charset="0"/>
+              </a:rPr>
+              <a:t>pf_not_exists_t</a:t>
+            </a:r>
+            <a:r>
+              <a:rPr lang="en-US" dirty="0">
+                <a:latin typeface="Courier New" panose="02070309020205020404" pitchFamily="49" charset="0"/>
+                <a:cs typeface="Courier New" panose="02070309020205020404" pitchFamily="49" charset="0"/>
+              </a:rPr>
+              <a:t>,</a:t>
+            </a:r>
+          </a:p>
+          <a:p>
+            <a:pPr marL="0" indent="0">
+              <a:buNone/>
+            </a:pPr>
+            <a:r>
+              <a:rPr lang="en-US" dirty="0">
+                <a:latin typeface="Courier New" panose="02070309020205020404" pitchFamily="49" charset="0"/>
+                <a:cs typeface="Courier New" panose="02070309020205020404" pitchFamily="49" charset="0"/>
+              </a:rPr>
+              <a:t>    assume a </a:t>
+            </a:r>
+            <a:r>
+              <a:rPr lang="en-US" dirty="0" err="1">
+                <a:latin typeface="Courier New" panose="02070309020205020404" pitchFamily="49" charset="0"/>
+                <a:cs typeface="Courier New" panose="02070309020205020404" pitchFamily="49" charset="0"/>
+              </a:rPr>
+              <a:t>pf_a</a:t>
+            </a:r>
+            <a:r>
+              <a:rPr lang="en-US" dirty="0">
+                <a:latin typeface="Courier New" panose="02070309020205020404" pitchFamily="49" charset="0"/>
+                <a:cs typeface="Courier New" panose="02070309020205020404" pitchFamily="49" charset="0"/>
+              </a:rPr>
+              <a:t>,</a:t>
+            </a:r>
+          </a:p>
+          <a:p>
+            <a:pPr marL="0" indent="0">
+              <a:buNone/>
+            </a:pPr>
+            <a:r>
+              <a:rPr lang="en-US" dirty="0">
+                <a:latin typeface="Courier New" panose="02070309020205020404" pitchFamily="49" charset="0"/>
+                <a:cs typeface="Courier New" panose="02070309020205020404" pitchFamily="49" charset="0"/>
+              </a:rPr>
+              <a:t>    have </a:t>
+            </a:r>
+            <a:r>
+              <a:rPr lang="en-US" dirty="0" err="1">
+                <a:latin typeface="Courier New" panose="02070309020205020404" pitchFamily="49" charset="0"/>
+                <a:cs typeface="Courier New" panose="02070309020205020404" pitchFamily="49" charset="0"/>
+              </a:rPr>
+              <a:t>pf_not_a</a:t>
+            </a:r>
+            <a:r>
+              <a:rPr lang="en-US" dirty="0">
+                <a:latin typeface="Courier New" panose="02070309020205020404" pitchFamily="49" charset="0"/>
+                <a:cs typeface="Courier New" panose="02070309020205020404" pitchFamily="49" charset="0"/>
+              </a:rPr>
+              <a:t> := </a:t>
+            </a:r>
+            <a:r>
+              <a:rPr lang="en-US" dirty="0" err="1">
+                <a:latin typeface="Courier New" panose="02070309020205020404" pitchFamily="49" charset="0"/>
+                <a:cs typeface="Courier New" panose="02070309020205020404" pitchFamily="49" charset="0"/>
+              </a:rPr>
+              <a:t>pf_forall_t_not</a:t>
+            </a:r>
+            <a:r>
+              <a:rPr lang="en-US" dirty="0">
+                <a:latin typeface="Courier New" panose="02070309020205020404" pitchFamily="49" charset="0"/>
+                <a:cs typeface="Courier New" panose="02070309020205020404" pitchFamily="49" charset="0"/>
+              </a:rPr>
+              <a:t> a,</a:t>
+            </a:r>
+          </a:p>
+          <a:p>
+            <a:pPr marL="0" indent="0">
+              <a:buNone/>
+            </a:pPr>
+            <a:r>
+              <a:rPr lang="en-US" dirty="0">
+                <a:latin typeface="Courier New" panose="02070309020205020404" pitchFamily="49" charset="0"/>
+                <a:cs typeface="Courier New" panose="02070309020205020404" pitchFamily="49" charset="0"/>
+              </a:rPr>
+              <a:t>    exact </a:t>
+            </a:r>
+            <a:r>
+              <a:rPr lang="en-US" dirty="0" err="1">
+                <a:latin typeface="Courier New" panose="02070309020205020404" pitchFamily="49" charset="0"/>
+                <a:cs typeface="Courier New" panose="02070309020205020404" pitchFamily="49" charset="0"/>
+              </a:rPr>
+              <a:t>pf_not_a</a:t>
+            </a:r>
+            <a:r>
+              <a:rPr lang="en-US" dirty="0">
+                <a:latin typeface="Courier New" panose="02070309020205020404" pitchFamily="49" charset="0"/>
+                <a:cs typeface="Courier New" panose="02070309020205020404" pitchFamily="49" charset="0"/>
+              </a:rPr>
+              <a:t> </a:t>
+            </a:r>
+            <a:r>
+              <a:rPr lang="en-US" dirty="0" err="1">
+                <a:latin typeface="Courier New" panose="02070309020205020404" pitchFamily="49" charset="0"/>
+                <a:cs typeface="Courier New" panose="02070309020205020404" pitchFamily="49" charset="0"/>
+              </a:rPr>
+              <a:t>pf_a</a:t>
+            </a:r>
+            <a:endParaRPr lang="en-US" dirty="0">
+              <a:latin typeface="Courier New" panose="02070309020205020404" pitchFamily="49" charset="0"/>
+              <a:cs typeface="Courier New" panose="02070309020205020404" pitchFamily="49" charset="0"/>
+            </a:endParaRPr>
+          </a:p>
+          <a:p>
+            <a:pPr marL="0" indent="0">
+              <a:buNone/>
+            </a:pPr>
+            <a:r>
+              <a:rPr lang="en-US" dirty="0">
+                <a:latin typeface="Courier New" panose="02070309020205020404" pitchFamily="49" charset="0"/>
+                <a:cs typeface="Courier New" panose="02070309020205020404" pitchFamily="49" charset="0"/>
+              </a:rPr>
+              <a:t>end</a:t>
+            </a:r>
+          </a:p>
+        </p:txBody>
+      </p:sp>
+      <p:sp>
+        <p:nvSpPr>
+          <p:cNvPr id="4" name="Slide Number Placeholder 3">
+            <a:extLst>
+              <a:ext uri="{FF2B5EF4-FFF2-40B4-BE49-F238E27FC236}">
+                <a16:creationId xmlns:a16="http://schemas.microsoft.com/office/drawing/2014/main" id="{EC3A8683-0F7C-BA4F-A863-7EF7640F3965}"/>
+              </a:ext>
+            </a:extLst>
+          </p:cNvPr>
+          <p:cNvSpPr>
+            <a:spLocks noGrp="1"/>
+          </p:cNvSpPr>
+          <p:nvPr>
+            <p:ph type="sldNum" sz="quarter" idx="12"/>
+          </p:nvPr>
+        </p:nvSpPr>
+        <p:spPr/>
+        <p:txBody>
+          <a:bodyPr/>
+          <a:lstStyle/>
+          <a:p>
+            <a:fld id="{3352CBF5-17B8-4387-88A6-ABF9F8C64D5A}" type="slidenum">
+              <a:rPr lang="en-US" smtClean="0"/>
+              <a:t>20</a:t>
+            </a:fld>
+            <a:endParaRPr lang="en-US"/>
+          </a:p>
+        </p:txBody>
+      </p:sp>
+    </p:spTree>
+    <p:extLst>
+      <p:ext uri="{BB962C8B-B14F-4D97-AF65-F5344CB8AC3E}">
+        <p14:creationId xmlns:p14="http://schemas.microsoft.com/office/powerpoint/2010/main" val="1946087651"/>
+      </p:ext>
+    </p:extLst>
+  </p:cSld>
+  <p:clrMapOvr>
+    <a:masterClrMapping/>
+  </p:clrMapOvr>
+</p:sld>
+</file>
+
+<file path=ppt/slides/slide21.xml><?xml version="1.0" encoding="utf-8"?>
 <p:sld xmlns:a="http://schemas.openxmlformats.org/drawingml/2006/main" xmlns:r="http://schemas.openxmlformats.org/officeDocument/2006/relationships" xmlns:p="http://schemas.openxmlformats.org/presentationml/2006/main">
   <p:cSld>
     <p:bg>
@@ -7068,7 +7427,7 @@
           <a:p>
             <a:fld id="{3352CBF5-17B8-4387-88A6-ABF9F8C64D5A}" type="slidenum">
               <a:rPr lang="en-US" smtClean="0"/>
-              <a:t>20</a:t>
+              <a:t>21</a:t>
             </a:fld>
             <a:endParaRPr lang="en-US"/>
           </a:p>

</xml_diff>

<commit_message>
Fixed typo on slide
</commit_message>
<xml_diff>
--- a/11_Existential_Quantification/Exists.pptx
+++ b/11_Existential_Quantification/Exists.pptx
@@ -7795,7 +7795,21 @@
                 <a:latin typeface="Courier New" panose="02070309020205020404" pitchFamily="49" charset="0"/>
                 <a:cs typeface="Courier New" panose="02070309020205020404" pitchFamily="49" charset="0"/>
               </a:rPr>
-              <a:t>(T : Type) (pred: T → Prop) (w : T) (e : p w)</a:t>
+              <a:t>(T : Type) (pred: T → Prop) (w : T) (e </a:t>
+            </a:r>
+            <a:r>
+              <a:rPr lang="en-US">
+                <a:latin typeface="Courier New" panose="02070309020205020404" pitchFamily="49" charset="0"/>
+                <a:cs typeface="Courier New" panose="02070309020205020404" pitchFamily="49" charset="0"/>
+              </a:rPr>
+              <a:t>: pred </a:t>
+            </a:r>
+            <a:r>
+              <a:rPr lang="en-US" dirty="0">
+                <a:latin typeface="Courier New" panose="02070309020205020404" pitchFamily="49" charset="0"/>
+                <a:cs typeface="Courier New" panose="02070309020205020404" pitchFamily="49" charset="0"/>
+              </a:rPr>
+              <a:t>w)</a:t>
             </a:r>
           </a:p>
           <a:p>

</xml_diff>

<commit_message>
Minor tweaks to existential quantification
</commit_message>
<xml_diff>
--- a/11_Existential_Quantification/Exists.pptx
+++ b/11_Existential_Quantification/Exists.pptx
@@ -3843,11 +3843,46 @@
               <a:buNone/>
             </a:pPr>
             <a:r>
+              <a:rPr lang="en-US" sz="1800">
+                <a:latin typeface="Courier New" panose="02070309020205020404" pitchFamily="49" charset="0"/>
+                <a:cs typeface="Courier New" panose="02070309020205020404" pitchFamily="49" charset="0"/>
+              </a:rPr>
+              <a:t>Q: </a:t>
+            </a:r>
+            <a:r>
               <a:rPr lang="en-US" sz="1800" dirty="0">
                 <a:latin typeface="Courier New" panose="02070309020205020404" pitchFamily="49" charset="0"/>
                 <a:cs typeface="Courier New" panose="02070309020205020404" pitchFamily="49" charset="0"/>
               </a:rPr>
-              <a:t>∀ Q : Prop; ∀ T : Type; ∀ P : T → Prop; ∃ x : T, P x; ∀ w : T, P w → Q</a:t>
+              <a:t>Prop</a:t>
+            </a:r>
+            <a:r>
+              <a:rPr lang="en-US" sz="1800">
+                <a:latin typeface="Courier New" panose="02070309020205020404" pitchFamily="49" charset="0"/>
+                <a:cs typeface="Courier New" panose="02070309020205020404" pitchFamily="49" charset="0"/>
+              </a:rPr>
+              <a:t>; T: Type; P: (T → Prop); ∃(x: T), </a:t>
+            </a:r>
+            <a:r>
+              <a:rPr lang="en-US" sz="1800" dirty="0">
+                <a:latin typeface="Courier New" panose="02070309020205020404" pitchFamily="49" charset="0"/>
+                <a:cs typeface="Courier New" panose="02070309020205020404" pitchFamily="49" charset="0"/>
+              </a:rPr>
+              <a:t>P x</a:t>
+            </a:r>
+            <a:r>
+              <a:rPr lang="en-US" sz="1800">
+                <a:latin typeface="Courier New" panose="02070309020205020404" pitchFamily="49" charset="0"/>
+                <a:cs typeface="Courier New" panose="02070309020205020404" pitchFamily="49" charset="0"/>
+              </a:rPr>
+              <a:t>; (∀(a: T), P a) </a:t>
+            </a:r>
+            <a:r>
+              <a:rPr lang="en-US" sz="1800" dirty="0">
+                <a:latin typeface="Courier New" panose="02070309020205020404" pitchFamily="49" charset="0"/>
+                <a:cs typeface="Courier New" panose="02070309020205020404" pitchFamily="49" charset="0"/>
+              </a:rPr>
+              <a:t>→ Q</a:t>
             </a:r>
           </a:p>
           <a:p>
@@ -6245,7 +6280,7 @@
                 <a:latin typeface="Courier New" panose="02070309020205020404" pitchFamily="49" charset="0"/>
                 <a:cs typeface="Courier New" panose="02070309020205020404" pitchFamily="49" charset="0"/>
               </a:rPr>
-              <a:t>  ∀ (T: Type) (pred: (T → Prop)),</a:t>
+              <a:t>  ∀(T: Type) (pred: (T → Prop)),</a:t>
             </a:r>
           </a:p>
           <a:p>
@@ -7795,21 +7830,7 @@
                 <a:latin typeface="Courier New" panose="02070309020205020404" pitchFamily="49" charset="0"/>
                 <a:cs typeface="Courier New" panose="02070309020205020404" pitchFamily="49" charset="0"/>
               </a:rPr>
-              <a:t>(T : Type) (pred: T → Prop) (w : T) (e </a:t>
-            </a:r>
-            <a:r>
-              <a:rPr lang="en-US">
-                <a:latin typeface="Courier New" panose="02070309020205020404" pitchFamily="49" charset="0"/>
-                <a:cs typeface="Courier New" panose="02070309020205020404" pitchFamily="49" charset="0"/>
-              </a:rPr>
-              <a:t>: pred </a:t>
-            </a:r>
-            <a:r>
-              <a:rPr lang="en-US" dirty="0">
-                <a:latin typeface="Courier New" panose="02070309020205020404" pitchFamily="49" charset="0"/>
-                <a:cs typeface="Courier New" panose="02070309020205020404" pitchFamily="49" charset="0"/>
-              </a:rPr>
-              <a:t>w)</a:t>
+              <a:t>(T : Type) (pred: T → Prop) (w : T) (e : pred w)</a:t>
             </a:r>
           </a:p>
           <a:p>

</xml_diff>

<commit_message>
Added additional satisfiability material
</commit_message>
<xml_diff>
--- a/11_Existential_Quantification/Exists.pptx
+++ b/11_Existential_Quantification/Exists.pptx
@@ -5,7 +5,7 @@
     <p:sldMasterId id="2147483648" r:id="rId1"/>
   </p:sldMasterIdLst>
   <p:notesMasterIdLst>
-    <p:notesMasterId r:id="rId24"/>
+    <p:notesMasterId r:id="rId27"/>
   </p:notesMasterIdLst>
   <p:sldIdLst>
     <p:sldId id="258" r:id="rId2"/>
@@ -29,7 +29,10 @@
     <p:sldId id="373" r:id="rId20"/>
     <p:sldId id="374" r:id="rId21"/>
     <p:sldId id="375" r:id="rId22"/>
-    <p:sldId id="261" r:id="rId23"/>
+    <p:sldId id="376" r:id="rId23"/>
+    <p:sldId id="377" r:id="rId24"/>
+    <p:sldId id="378" r:id="rId25"/>
+    <p:sldId id="261" r:id="rId26"/>
   </p:sldIdLst>
   <p:sldSz cx="12192000" cy="6858000"/>
   <p:notesSz cx="6858000" cy="9144000"/>
@@ -7220,8 +7223,29 @@
         </p:nvSpPr>
         <p:spPr/>
         <p:txBody>
-          <a:bodyPr/>
-          <a:lstStyle/>
+          <a:bodyPr>
+            <a:normAutofit/>
+          </a:bodyPr>
+          <a:lstStyle/>
+          <a:p>
+            <a:r>
+              <a:rPr lang="en-US" dirty="0"/>
+              <a:t>Satisfiability is about finding values for sub-propositions such that a larger proposition is true</a:t>
+            </a:r>
+          </a:p>
+          <a:p>
+            <a:r>
+              <a:rPr lang="en-US" dirty="0"/>
+              <a:t>Typically, we like to phrase the larger proposition in what is referred to as Conjunctive Normal Form, or CNF</a:t>
+            </a:r>
+          </a:p>
+          <a:p>
+            <a:pPr lvl="1"/>
+            <a:r>
+              <a:rPr lang="en-US" dirty="0"/>
+              <a:t>E.g., (x1 ∨ x2 ∨ ¬x3 ∨ x4) ∧ (¬x1 ∨ x2 ∨ ¬x3)</a:t>
+            </a:r>
+          </a:p>
           <a:p>
             <a:r>
               <a:rPr lang="en-US" dirty="0"/>
@@ -7232,22 +7256,14 @@
             <a:pPr lvl="1"/>
             <a:r>
               <a:rPr lang="en-US" dirty="0"/>
-              <a:t>(P or Q) and (¬P or ¬</a:t>
-            </a:r>
-            <a:r>
-              <a:rPr lang="en-US"/>
-              <a:t>Q)</a:t>
+              <a:t>(P or Q) and (¬P or ¬Q)</a:t>
             </a:r>
           </a:p>
           <a:p>
             <a:pPr lvl="1"/>
-            <a:endParaRPr lang="en-US" dirty="0"/>
-          </a:p>
-          <a:p>
-            <a:pPr lvl="1"/>
             <a:r>
               <a:rPr lang="en-US" dirty="0"/>
-              <a:t>(P or Q) and (¬P or ¬Q) and (P or ¬Q)</a:t>
+              <a:t>See proof</a:t>
             </a:r>
           </a:p>
         </p:txBody>
@@ -7295,6 +7311,454 @@
 </file>
 
 <file path=ppt/slides/slide22.xml><?xml version="1.0" encoding="utf-8"?>
+<p:sld xmlns:a="http://schemas.openxmlformats.org/drawingml/2006/main" xmlns:r="http://schemas.openxmlformats.org/officeDocument/2006/relationships" xmlns:p="http://schemas.openxmlformats.org/presentationml/2006/main">
+  <p:cSld>
+    <p:spTree>
+      <p:nvGrpSpPr>
+        <p:cNvPr id="1" name=""/>
+        <p:cNvGrpSpPr/>
+        <p:nvPr/>
+      </p:nvGrpSpPr>
+      <p:grpSpPr>
+        <a:xfrm>
+          <a:off x="0" y="0"/>
+          <a:ext cx="0" cy="0"/>
+          <a:chOff x="0" y="0"/>
+          <a:chExt cx="0" cy="0"/>
+        </a:xfrm>
+      </p:grpSpPr>
+      <p:sp>
+        <p:nvSpPr>
+          <p:cNvPr id="2" name="Title 1">
+            <a:extLst>
+              <a:ext uri="{FF2B5EF4-FFF2-40B4-BE49-F238E27FC236}">
+                <a16:creationId xmlns:a16="http://schemas.microsoft.com/office/drawing/2014/main" id="{D201667F-1019-6349-B04F-A8BF58A7103B}"/>
+              </a:ext>
+            </a:extLst>
+          </p:cNvPr>
+          <p:cNvSpPr>
+            <a:spLocks noGrp="1"/>
+          </p:cNvSpPr>
+          <p:nvPr>
+            <p:ph type="title"/>
+          </p:nvPr>
+        </p:nvSpPr>
+        <p:spPr/>
+        <p:txBody>
+          <a:bodyPr/>
+          <a:lstStyle/>
+          <a:p>
+            <a:r>
+              <a:rPr lang="en-US" dirty="0"/>
+              <a:t>Exercises</a:t>
+            </a:r>
+          </a:p>
+        </p:txBody>
+      </p:sp>
+      <p:sp>
+        <p:nvSpPr>
+          <p:cNvPr id="3" name="Content Placeholder 2">
+            <a:extLst>
+              <a:ext uri="{FF2B5EF4-FFF2-40B4-BE49-F238E27FC236}">
+                <a16:creationId xmlns:a16="http://schemas.microsoft.com/office/drawing/2014/main" id="{0EB0A801-F8EF-0544-A465-9CCD701F3101}"/>
+              </a:ext>
+            </a:extLst>
+          </p:cNvPr>
+          <p:cNvSpPr>
+            <a:spLocks noGrp="1"/>
+          </p:cNvSpPr>
+          <p:nvPr>
+            <p:ph idx="1"/>
+          </p:nvPr>
+        </p:nvSpPr>
+        <p:spPr/>
+        <p:txBody>
+          <a:bodyPr/>
+          <a:lstStyle/>
+          <a:p>
+            <a:r>
+              <a:rPr lang="en-US" dirty="0"/>
+              <a:t>Do there exist values for P and Q such that:</a:t>
+            </a:r>
+            <a:br>
+              <a:rPr lang="en-US" dirty="0"/>
+            </a:br>
+            <a:r>
+              <a:rPr lang="en-US" dirty="0"/>
+              <a:t>  (P ∨ Q) ∧ (¬P ∨ ¬Q) ∧ (¬P or Q) is true?</a:t>
+            </a:r>
+            <a:br>
+              <a:rPr lang="en-US" dirty="0"/>
+            </a:br>
+            <a:r>
+              <a:rPr lang="en-US" dirty="0"/>
+              <a:t>If so, prove it.</a:t>
+            </a:r>
+          </a:p>
+          <a:p>
+            <a:r>
+              <a:rPr lang="en-US" dirty="0"/>
+              <a:t>Do there exist values for P and Q such that:</a:t>
+            </a:r>
+            <a:br>
+              <a:rPr lang="en-US" dirty="0"/>
+            </a:br>
+            <a:r>
+              <a:rPr lang="en-US" dirty="0"/>
+              <a:t>  (P ∨ Q) ∧ (¬P ∨ ¬Q) ∧ (¬P ∨ Q) ∧ (¬Q) is true?</a:t>
+            </a:r>
+            <a:br>
+              <a:rPr lang="en-US" dirty="0"/>
+            </a:br>
+            <a:r>
+              <a:rPr lang="en-US" dirty="0"/>
+              <a:t>If so, prove it.</a:t>
+            </a:r>
+          </a:p>
+          <a:p>
+            <a:endParaRPr lang="en-US" dirty="0"/>
+          </a:p>
+        </p:txBody>
+      </p:sp>
+      <p:sp>
+        <p:nvSpPr>
+          <p:cNvPr id="4" name="Slide Number Placeholder 3">
+            <a:extLst>
+              <a:ext uri="{FF2B5EF4-FFF2-40B4-BE49-F238E27FC236}">
+                <a16:creationId xmlns:a16="http://schemas.microsoft.com/office/drawing/2014/main" id="{55CCA166-D4D0-124F-A2DC-3FE3E3BAFD25}"/>
+              </a:ext>
+            </a:extLst>
+          </p:cNvPr>
+          <p:cNvSpPr>
+            <a:spLocks noGrp="1"/>
+          </p:cNvSpPr>
+          <p:nvPr>
+            <p:ph type="sldNum" sz="quarter" idx="12"/>
+          </p:nvPr>
+        </p:nvSpPr>
+        <p:spPr/>
+        <p:txBody>
+          <a:bodyPr/>
+          <a:lstStyle/>
+          <a:p>
+            <a:fld id="{3352CBF5-17B8-4387-88A6-ABF9F8C64D5A}" type="slidenum">
+              <a:rPr lang="en-US" smtClean="0"/>
+              <a:t>22</a:t>
+            </a:fld>
+            <a:endParaRPr lang="en-US"/>
+          </a:p>
+        </p:txBody>
+      </p:sp>
+    </p:spTree>
+    <p:extLst>
+      <p:ext uri="{BB962C8B-B14F-4D97-AF65-F5344CB8AC3E}">
+        <p14:creationId xmlns:p14="http://schemas.microsoft.com/office/powerpoint/2010/main" val="3516745476"/>
+      </p:ext>
+    </p:extLst>
+  </p:cSld>
+  <p:clrMapOvr>
+    <a:masterClrMapping/>
+  </p:clrMapOvr>
+</p:sld>
+</file>
+
+<file path=ppt/slides/slide23.xml><?xml version="1.0" encoding="utf-8"?>
+<p:sld xmlns:a="http://schemas.openxmlformats.org/drawingml/2006/main" xmlns:r="http://schemas.openxmlformats.org/officeDocument/2006/relationships" xmlns:p="http://schemas.openxmlformats.org/presentationml/2006/main">
+  <p:cSld>
+    <p:spTree>
+      <p:nvGrpSpPr>
+        <p:cNvPr id="1" name=""/>
+        <p:cNvGrpSpPr/>
+        <p:nvPr/>
+      </p:nvGrpSpPr>
+      <p:grpSpPr>
+        <a:xfrm>
+          <a:off x="0" y="0"/>
+          <a:ext cx="0" cy="0"/>
+          <a:chOff x="0" y="0"/>
+          <a:chExt cx="0" cy="0"/>
+        </a:xfrm>
+      </p:grpSpPr>
+      <p:sp>
+        <p:nvSpPr>
+          <p:cNvPr id="2" name="Title 1">
+            <a:extLst>
+              <a:ext uri="{FF2B5EF4-FFF2-40B4-BE49-F238E27FC236}">
+                <a16:creationId xmlns:a16="http://schemas.microsoft.com/office/drawing/2014/main" id="{D15FCCB9-DE05-DA48-938E-D78895636D08}"/>
+              </a:ext>
+            </a:extLst>
+          </p:cNvPr>
+          <p:cNvSpPr>
+            <a:spLocks noGrp="1"/>
+          </p:cNvSpPr>
+          <p:nvPr>
+            <p:ph type="title"/>
+          </p:nvPr>
+        </p:nvSpPr>
+        <p:spPr/>
+        <p:txBody>
+          <a:bodyPr/>
+          <a:lstStyle/>
+          <a:p>
+            <a:r>
+              <a:rPr lang="en-US" dirty="0"/>
+              <a:t>3-SAT</a:t>
+            </a:r>
+          </a:p>
+        </p:txBody>
+      </p:sp>
+      <p:sp>
+        <p:nvSpPr>
+          <p:cNvPr id="3" name="Content Placeholder 2">
+            <a:extLst>
+              <a:ext uri="{FF2B5EF4-FFF2-40B4-BE49-F238E27FC236}">
+                <a16:creationId xmlns:a16="http://schemas.microsoft.com/office/drawing/2014/main" id="{8EF7C569-4E36-314D-BB66-730CB71B6C0D}"/>
+              </a:ext>
+            </a:extLst>
+          </p:cNvPr>
+          <p:cNvSpPr>
+            <a:spLocks noGrp="1"/>
+          </p:cNvSpPr>
+          <p:nvPr>
+            <p:ph idx="1"/>
+          </p:nvPr>
+        </p:nvSpPr>
+        <p:spPr/>
+        <p:txBody>
+          <a:bodyPr/>
+          <a:lstStyle/>
+          <a:p>
+            <a:r>
+              <a:rPr lang="en-US" dirty="0"/>
+              <a:t>3-SAT is a special kind of satisfiability (SAT) problem where each of the disjunctions have </a:t>
+            </a:r>
+            <a:r>
+              <a:rPr lang="en-US" u="sng" dirty="0"/>
+              <a:t>no more than</a:t>
+            </a:r>
+            <a:r>
+              <a:rPr lang="en-US" dirty="0"/>
+              <a:t> 3 terms in each disjunction</a:t>
+            </a:r>
+          </a:p>
+          <a:p>
+            <a:pPr lvl="1"/>
+            <a:r>
+              <a:rPr lang="en-US" dirty="0"/>
+              <a:t>E.g., (P ∨ Q ∨ R) ∧ (¬P ∨ ¬Q ∨ ¬S) ∧ (¬P ∨ Q ∨ T) ∧ …</a:t>
+            </a:r>
+          </a:p>
+          <a:p>
+            <a:r>
+              <a:rPr lang="en-US" dirty="0"/>
+              <a:t>3-SAT is SAT, and 2-SAT is 3-SAT</a:t>
+            </a:r>
+          </a:p>
+          <a:p>
+            <a:r>
+              <a:rPr lang="en-US" dirty="0"/>
+              <a:t>All SAT problems can be reduced to 3-SAT problems</a:t>
+            </a:r>
+          </a:p>
+          <a:p>
+            <a:r>
+              <a:rPr lang="en-US" dirty="0"/>
+              <a:t>3-SAT (and hence SAT) is NP-complete</a:t>
+            </a:r>
+          </a:p>
+          <a:p>
+            <a:pPr lvl="1"/>
+            <a:endParaRPr lang="en-US" dirty="0"/>
+          </a:p>
+          <a:p>
+            <a:pPr lvl="1"/>
+            <a:endParaRPr lang="en-US" dirty="0"/>
+          </a:p>
+        </p:txBody>
+      </p:sp>
+      <p:sp>
+        <p:nvSpPr>
+          <p:cNvPr id="4" name="Slide Number Placeholder 3">
+            <a:extLst>
+              <a:ext uri="{FF2B5EF4-FFF2-40B4-BE49-F238E27FC236}">
+                <a16:creationId xmlns:a16="http://schemas.microsoft.com/office/drawing/2014/main" id="{FB595F05-AC5F-DF43-A329-C979525D2698}"/>
+              </a:ext>
+            </a:extLst>
+          </p:cNvPr>
+          <p:cNvSpPr>
+            <a:spLocks noGrp="1"/>
+          </p:cNvSpPr>
+          <p:nvPr>
+            <p:ph type="sldNum" sz="quarter" idx="12"/>
+          </p:nvPr>
+        </p:nvSpPr>
+        <p:spPr/>
+        <p:txBody>
+          <a:bodyPr/>
+          <a:lstStyle/>
+          <a:p>
+            <a:fld id="{3352CBF5-17B8-4387-88A6-ABF9F8C64D5A}" type="slidenum">
+              <a:rPr lang="en-US" smtClean="0"/>
+              <a:t>23</a:t>
+            </a:fld>
+            <a:endParaRPr lang="en-US"/>
+          </a:p>
+        </p:txBody>
+      </p:sp>
+    </p:spTree>
+    <p:extLst>
+      <p:ext uri="{BB962C8B-B14F-4D97-AF65-F5344CB8AC3E}">
+        <p14:creationId xmlns:p14="http://schemas.microsoft.com/office/powerpoint/2010/main" val="3046138563"/>
+      </p:ext>
+    </p:extLst>
+  </p:cSld>
+  <p:clrMapOvr>
+    <a:masterClrMapping/>
+  </p:clrMapOvr>
+</p:sld>
+</file>
+
+<file path=ppt/slides/slide24.xml><?xml version="1.0" encoding="utf-8"?>
+<p:sld xmlns:a="http://schemas.openxmlformats.org/drawingml/2006/main" xmlns:r="http://schemas.openxmlformats.org/officeDocument/2006/relationships" xmlns:p="http://schemas.openxmlformats.org/presentationml/2006/main">
+  <p:cSld>
+    <p:spTree>
+      <p:nvGrpSpPr>
+        <p:cNvPr id="1" name=""/>
+        <p:cNvGrpSpPr/>
+        <p:nvPr/>
+      </p:nvGrpSpPr>
+      <p:grpSpPr>
+        <a:xfrm>
+          <a:off x="0" y="0"/>
+          <a:ext cx="0" cy="0"/>
+          <a:chOff x="0" y="0"/>
+          <a:chExt cx="0" cy="0"/>
+        </a:xfrm>
+      </p:grpSpPr>
+      <p:sp>
+        <p:nvSpPr>
+          <p:cNvPr id="2" name="Title 1">
+            <a:extLst>
+              <a:ext uri="{FF2B5EF4-FFF2-40B4-BE49-F238E27FC236}">
+                <a16:creationId xmlns:a16="http://schemas.microsoft.com/office/drawing/2014/main" id="{898B301D-5B7B-9F40-B38B-546275C39276}"/>
+              </a:ext>
+            </a:extLst>
+          </p:cNvPr>
+          <p:cNvSpPr>
+            <a:spLocks noGrp="1"/>
+          </p:cNvSpPr>
+          <p:nvPr>
+            <p:ph type="title"/>
+          </p:nvPr>
+        </p:nvSpPr>
+        <p:spPr/>
+        <p:txBody>
+          <a:bodyPr/>
+          <a:lstStyle/>
+          <a:p>
+            <a:r>
+              <a:rPr lang="en-US" dirty="0"/>
+              <a:t>Exercise</a:t>
+            </a:r>
+          </a:p>
+        </p:txBody>
+      </p:sp>
+      <p:sp>
+        <p:nvSpPr>
+          <p:cNvPr id="3" name="Content Placeholder 2">
+            <a:extLst>
+              <a:ext uri="{FF2B5EF4-FFF2-40B4-BE49-F238E27FC236}">
+                <a16:creationId xmlns:a16="http://schemas.microsoft.com/office/drawing/2014/main" id="{4B10F106-2103-FE4C-8B21-FAA407CF0711}"/>
+              </a:ext>
+            </a:extLst>
+          </p:cNvPr>
+          <p:cNvSpPr>
+            <a:spLocks noGrp="1"/>
+          </p:cNvSpPr>
+          <p:nvPr>
+            <p:ph idx="1"/>
+          </p:nvPr>
+        </p:nvSpPr>
+        <p:spPr/>
+        <p:txBody>
+          <a:bodyPr/>
+          <a:lstStyle/>
+          <a:p>
+            <a:r>
+              <a:rPr lang="en-US" dirty="0"/>
+              <a:t>Do there exist values for P, Q, and R such that:</a:t>
+            </a:r>
+            <a:br>
+              <a:rPr lang="en-US" dirty="0"/>
+            </a:br>
+            <a:r>
+              <a:rPr lang="en-US" dirty="0"/>
+              <a:t>  (P ∨ Q ∨ R) ∧ (¬P ∨ ¬Q ∨ ¬R) ∧ (¬P ∨ Q ∨ R) ∧ (¬Q ∨ ¬R) is </a:t>
+            </a:r>
+            <a:r>
+              <a:rPr lang="en-US"/>
+              <a:t>true?</a:t>
+            </a:r>
+            <a:br>
+              <a:rPr lang="en-US"/>
+            </a:br>
+            <a:r>
+              <a:rPr lang="en-US"/>
+              <a:t>If </a:t>
+            </a:r>
+            <a:r>
+              <a:rPr lang="en-US" dirty="0"/>
+              <a:t>so, prove it.</a:t>
+            </a:r>
+          </a:p>
+          <a:p>
+            <a:endParaRPr lang="en-US" dirty="0"/>
+          </a:p>
+        </p:txBody>
+      </p:sp>
+      <p:sp>
+        <p:nvSpPr>
+          <p:cNvPr id="4" name="Slide Number Placeholder 3">
+            <a:extLst>
+              <a:ext uri="{FF2B5EF4-FFF2-40B4-BE49-F238E27FC236}">
+                <a16:creationId xmlns:a16="http://schemas.microsoft.com/office/drawing/2014/main" id="{8163C2F7-D32B-FF44-AC1A-CFB5B0615951}"/>
+              </a:ext>
+            </a:extLst>
+          </p:cNvPr>
+          <p:cNvSpPr>
+            <a:spLocks noGrp="1"/>
+          </p:cNvSpPr>
+          <p:nvPr>
+            <p:ph type="sldNum" sz="quarter" idx="12"/>
+          </p:nvPr>
+        </p:nvSpPr>
+        <p:spPr/>
+        <p:txBody>
+          <a:bodyPr/>
+          <a:lstStyle/>
+          <a:p>
+            <a:fld id="{3352CBF5-17B8-4387-88A6-ABF9F8C64D5A}" type="slidenum">
+              <a:rPr lang="en-US" smtClean="0"/>
+              <a:t>24</a:t>
+            </a:fld>
+            <a:endParaRPr lang="en-US"/>
+          </a:p>
+        </p:txBody>
+      </p:sp>
+    </p:spTree>
+    <p:extLst>
+      <p:ext uri="{BB962C8B-B14F-4D97-AF65-F5344CB8AC3E}">
+        <p14:creationId xmlns:p14="http://schemas.microsoft.com/office/powerpoint/2010/main" val="20393050"/>
+      </p:ext>
+    </p:extLst>
+  </p:cSld>
+  <p:clrMapOvr>
+    <a:masterClrMapping/>
+  </p:clrMapOvr>
+</p:sld>
+</file>
+
+<file path=ppt/slides/slide25.xml><?xml version="1.0" encoding="utf-8"?>
 <p:sld xmlns:a="http://schemas.openxmlformats.org/drawingml/2006/main" xmlns:r="http://schemas.openxmlformats.org/officeDocument/2006/relationships" xmlns:p="http://schemas.openxmlformats.org/presentationml/2006/main">
   <p:cSld>
     <p:bg>
@@ -7565,7 +8029,7 @@
           <a:p>
             <a:fld id="{3352CBF5-17B8-4387-88A6-ABF9F8C64D5A}" type="slidenum">
               <a:rPr lang="en-US" smtClean="0"/>
-              <a:t>22</a:t>
+              <a:t>25</a:t>
             </a:fld>
             <a:endParaRPr lang="en-US"/>
           </a:p>

</xml_diff>